<commit_message>
add extra slide for assignment preparation
</commit_message>
<xml_diff>
--- a/src/main/scala/workshop5/Presentation.pptx
+++ b/src/main/scala/workshop5/Presentation.pptx
@@ -5,7 +5,7 @@
     <p:sldMasterId id="2147483648" r:id="rId1"/>
   </p:sldMasterIdLst>
   <p:notesMasterIdLst>
-    <p:notesMasterId r:id="rId25"/>
+    <p:notesMasterId r:id="rId26"/>
   </p:notesMasterIdLst>
   <p:sldIdLst>
     <p:sldId id="256" r:id="rId2"/>
@@ -24,13 +24,14 @@
     <p:sldId id="277" r:id="rId15"/>
     <p:sldId id="278" r:id="rId16"/>
     <p:sldId id="279" r:id="rId17"/>
-    <p:sldId id="270" r:id="rId18"/>
-    <p:sldId id="271" r:id="rId19"/>
-    <p:sldId id="272" r:id="rId20"/>
-    <p:sldId id="273" r:id="rId21"/>
-    <p:sldId id="274" r:id="rId22"/>
-    <p:sldId id="275" r:id="rId23"/>
-    <p:sldId id="280" r:id="rId24"/>
+    <p:sldId id="281" r:id="rId18"/>
+    <p:sldId id="270" r:id="rId19"/>
+    <p:sldId id="271" r:id="rId20"/>
+    <p:sldId id="272" r:id="rId21"/>
+    <p:sldId id="273" r:id="rId22"/>
+    <p:sldId id="274" r:id="rId23"/>
+    <p:sldId id="275" r:id="rId24"/>
+    <p:sldId id="280" r:id="rId25"/>
   </p:sldIdLst>
   <p:sldSz cx="12192000" cy="6858000"/>
   <p:notesSz cx="6858000" cy="9144000"/>
@@ -3375,11 +3376,7 @@
             </a:br>
             <a:r>
               <a:rPr lang="en-US" sz="4000" dirty="0" smtClean="0"/>
-              <a:t>Easy Module </a:t>
-            </a:r>
-            <a:r>
-              <a:rPr lang="en-US" sz="4000" dirty="0" smtClean="0"/>
-              <a:t>Development</a:t>
+              <a:t>Easy Module Development</a:t>
             </a:r>
             <a:r>
               <a:rPr lang="en-US" dirty="0" smtClean="0"/>
@@ -5143,11 +5140,6 @@
               </a:rPr>
               <a:t>}</a:t>
             </a:r>
-            <a:endParaRPr lang="en-US" sz="2400" dirty="0">
-              <a:latin typeface="Consolas" charset="0"/>
-              <a:ea typeface="Consolas" charset="0"/>
-              <a:cs typeface="Consolas" charset="0"/>
-            </a:endParaRPr>
           </a:p>
         </p:txBody>
       </p:sp>
@@ -6230,9 +6222,9 @@
                 <a:ea typeface="Consolas" charset="0"/>
                 <a:cs typeface="Consolas" charset="0"/>
               </a:rPr>
-              <a:t>! </a:t>
-            </a:r>
-            <a:r>
+              <a:t>! How do you do?"</a:t>
+            </a:r>
+            <a:br>
               <a:rPr lang="en-US" sz="2400" dirty="0">
                 <a:solidFill>
                   <a:srgbClr val="2A00FF"/>
@@ -6241,13 +6233,17 @@
                 <a:ea typeface="Consolas" charset="0"/>
                 <a:cs typeface="Consolas" charset="0"/>
               </a:rPr>
-              <a:t>How do you do?"</a:t>
+            </a:br>
+            <a:r>
+              <a:rPr lang="en-US" sz="2400" dirty="0">
+                <a:latin typeface="Consolas" charset="0"/>
+                <a:ea typeface="Consolas" charset="0"/>
+                <a:cs typeface="Consolas" charset="0"/>
+              </a:rPr>
+              <a:t>  }</a:t>
             </a:r>
             <a:br>
               <a:rPr lang="en-US" sz="2400" dirty="0">
-                <a:solidFill>
-                  <a:srgbClr val="2A00FF"/>
-                </a:solidFill>
                 <a:latin typeface="Consolas" charset="0"/>
                 <a:ea typeface="Consolas" charset="0"/>
                 <a:cs typeface="Consolas" charset="0"/>
@@ -6259,28 +6255,8 @@
                 <a:ea typeface="Consolas" charset="0"/>
                 <a:cs typeface="Consolas" charset="0"/>
               </a:rPr>
-              <a:t>  }</a:t>
-            </a:r>
-            <a:br>
-              <a:rPr lang="en-US" sz="2400" dirty="0">
-                <a:latin typeface="Consolas" charset="0"/>
-                <a:ea typeface="Consolas" charset="0"/>
-                <a:cs typeface="Consolas" charset="0"/>
-              </a:rPr>
-            </a:br>
-            <a:r>
-              <a:rPr lang="en-US" sz="2400" dirty="0">
-                <a:latin typeface="Consolas" charset="0"/>
-                <a:ea typeface="Consolas" charset="0"/>
-                <a:cs typeface="Consolas" charset="0"/>
-              </a:rPr>
               <a:t>}</a:t>
             </a:r>
-            <a:endParaRPr lang="en-US" sz="2400" dirty="0">
-              <a:latin typeface="Consolas" charset="0"/>
-              <a:ea typeface="Consolas" charset="0"/>
-              <a:cs typeface="Consolas" charset="0"/>
-            </a:endParaRPr>
           </a:p>
         </p:txBody>
       </p:sp>
@@ -6639,7 +6615,7 @@
       </p:grpSpPr>
       <p:sp>
         <p:nvSpPr>
-          <p:cNvPr id="2" name="Title 1"/>
+          <p:cNvPr id="4" name="Title 3"/>
           <p:cNvSpPr>
             <a:spLocks noGrp="1"/>
           </p:cNvSpPr>
@@ -6654,7 +6630,7 @@
           <a:p>
             <a:r>
               <a:rPr lang="en-US" dirty="0" smtClean="0"/>
-              <a:t>Assignment</a:t>
+              <a:t>Assignment (Preparation)</a:t>
             </a:r>
             <a:endParaRPr lang="en-US" dirty="0"/>
           </a:p>
@@ -6662,7 +6638,7 @@
       </p:sp>
       <p:sp>
         <p:nvSpPr>
-          <p:cNvPr id="3" name="Content Placeholder 2"/>
+          <p:cNvPr id="5" name="Content Placeholder 4"/>
           <p:cNvSpPr>
             <a:spLocks noGrp="1"/>
           </p:cNvSpPr>
@@ -6670,497 +6646,93 @@
             <p:ph idx="1"/>
           </p:nvPr>
         </p:nvSpPr>
-        <p:spPr>
-          <a:xfrm>
-            <a:off x="838199" y="1825625"/>
-            <a:ext cx="11061357" cy="4351338"/>
-          </a:xfrm>
-        </p:spPr>
+        <p:spPr/>
         <p:txBody>
           <a:bodyPr/>
           <a:lstStyle/>
           <a:p>
             <a:r>
               <a:rPr lang="en-US" dirty="0" smtClean="0"/>
-              <a:t>Create a </a:t>
-            </a:r>
-            <a:r>
-              <a:rPr lang="en-US" dirty="0" err="1" smtClean="0">
-                <a:latin typeface="Consolas" charset="0"/>
-                <a:ea typeface="Consolas" charset="0"/>
-                <a:cs typeface="Consolas" charset="0"/>
-              </a:rPr>
-              <a:t>WikipediaFacadeComponent</a:t>
-            </a:r>
-            <a:r>
-              <a:rPr lang="en-US" dirty="0" smtClean="0"/>
-              <a:t> with a </a:t>
-            </a:r>
-            <a:r>
-              <a:rPr lang="en-US" dirty="0" err="1" smtClean="0">
-                <a:latin typeface="Consolas" charset="0"/>
-                <a:ea typeface="Consolas" charset="0"/>
-                <a:cs typeface="Consolas" charset="0"/>
-              </a:rPr>
-              <a:t>WikipediaFacade</a:t>
-            </a:r>
-            <a:r>
-              <a:rPr lang="en-US" sz="2400" dirty="0" smtClean="0"/>
-              <a:t> </a:t>
-            </a:r>
-            <a:r>
-              <a:rPr lang="en-US" dirty="0" smtClean="0"/>
-              <a:t>and its access-point</a:t>
-            </a:r>
-          </a:p>
-          <a:p>
-            <a:r>
-              <a:rPr lang="en-US" dirty="0" smtClean="0"/>
-              <a:t>In the </a:t>
-            </a:r>
-            <a:r>
-              <a:rPr lang="en-US" sz="2400" dirty="0" err="1" smtClean="0">
-                <a:latin typeface="Consolas" charset="0"/>
-                <a:ea typeface="Consolas" charset="0"/>
-                <a:cs typeface="Consolas" charset="0"/>
-              </a:rPr>
-              <a:t>WikipediaFacade</a:t>
-            </a:r>
-            <a:r>
-              <a:rPr lang="en-US" dirty="0" smtClean="0"/>
-              <a:t> define:</a:t>
-            </a:r>
-          </a:p>
-          <a:p>
-            <a:pPr lvl="1"/>
-            <a:r>
-              <a:rPr lang="en-US" dirty="0" smtClean="0"/>
-              <a:t>A value </a:t>
-            </a:r>
-            <a:r>
-              <a:rPr lang="en-US" dirty="0" err="1" smtClean="0">
-                <a:latin typeface="Consolas" charset="0"/>
-                <a:ea typeface="Consolas" charset="0"/>
-                <a:cs typeface="Consolas" charset="0"/>
-              </a:rPr>
-              <a:t>baseUrl</a:t>
+              <a:t>Check out the </a:t>
+            </a:r>
+            <a:r>
+              <a:rPr lang="en-US" dirty="0"/>
+              <a:t>GitHub repository (</a:t>
+            </a:r>
+            <a:r>
+              <a:rPr lang="en-US" dirty="0">
+                <a:hlinkClick r:id="rId2"/>
+              </a:rPr>
+              <a:t>https://</a:t>
             </a:r>
             <a:r>
               <a:rPr lang="en-US" dirty="0" smtClean="0">
-                <a:latin typeface="Consolas" charset="0"/>
-                <a:ea typeface="Consolas" charset="0"/>
-                <a:cs typeface="Consolas" charset="0"/>
-              </a:rPr>
-              <a:t>: String</a:t>
-            </a:r>
-            <a:r>
-              <a:rPr lang="en-US" dirty="0" smtClean="0"/>
-              <a:t> (do not assign it here)</a:t>
-            </a:r>
-          </a:p>
-          <a:p>
-            <a:pPr lvl="1"/>
-            <a:r>
-              <a:rPr lang="en-US" dirty="0" smtClean="0"/>
-              <a:t>A method </a:t>
-            </a:r>
-            <a:r>
-              <a:rPr lang="en-US" dirty="0" smtClean="0">
-                <a:latin typeface="Consolas" charset="0"/>
-                <a:ea typeface="Consolas" charset="0"/>
-                <a:cs typeface="Consolas" charset="0"/>
-              </a:rPr>
-              <a:t>search(word: String): Observable[String]</a:t>
-            </a:r>
-            <a:r>
-              <a:rPr lang="en-US" dirty="0" smtClean="0">
-                <a:ea typeface="Consolas" charset="0"/>
-                <a:cs typeface="Consolas" charset="0"/>
-              </a:rPr>
-              <a:t> with the following implementation:</a:t>
-            </a:r>
-            <a:endParaRPr lang="en-US" dirty="0" smtClean="0">
-              <a:latin typeface="Consolas" charset="0"/>
-              <a:ea typeface="Consolas" charset="0"/>
-              <a:cs typeface="Consolas" charset="0"/>
-            </a:endParaRPr>
-          </a:p>
-          <a:p>
-            <a:pPr marL="914400" lvl="2" indent="0">
-              <a:buNone/>
-            </a:pPr>
-            <a:r>
-              <a:rPr lang="en-US" dirty="0" err="1">
-                <a:latin typeface="Consolas" charset="0"/>
-                <a:ea typeface="Consolas" charset="0"/>
-                <a:cs typeface="Consolas" charset="0"/>
-              </a:rPr>
-              <a:t>Observable.</a:t>
-            </a:r>
-            <a:r>
-              <a:rPr lang="en-US" i="1" dirty="0" err="1">
-                <a:latin typeface="Consolas" charset="0"/>
-                <a:ea typeface="Consolas" charset="0"/>
-                <a:cs typeface="Consolas" charset="0"/>
-              </a:rPr>
-              <a:t>defer</a:t>
-            </a:r>
-            <a:r>
-              <a:rPr lang="en-US" i="1" dirty="0">
-                <a:latin typeface="Consolas" charset="0"/>
-                <a:ea typeface="Consolas" charset="0"/>
-                <a:cs typeface="Consolas" charset="0"/>
-              </a:rPr>
-              <a:t> </a:t>
-            </a:r>
-            <a:r>
-              <a:rPr lang="en-US" dirty="0">
-                <a:latin typeface="Consolas" charset="0"/>
-                <a:ea typeface="Consolas" charset="0"/>
-                <a:cs typeface="Consolas" charset="0"/>
-              </a:rPr>
-              <a:t>{</a:t>
-            </a:r>
-            <a:br>
-              <a:rPr lang="en-US" dirty="0">
-                <a:latin typeface="Consolas" charset="0"/>
-                <a:ea typeface="Consolas" charset="0"/>
-                <a:cs typeface="Consolas" charset="0"/>
-              </a:rPr>
-            </a:br>
-            <a:r>
-              <a:rPr lang="en-US" dirty="0">
-                <a:latin typeface="Consolas" charset="0"/>
-                <a:ea typeface="Consolas" charset="0"/>
-                <a:cs typeface="Consolas" charset="0"/>
-              </a:rPr>
-              <a:t>  </a:t>
-            </a:r>
-            <a:r>
-              <a:rPr lang="en-US" b="1" dirty="0" err="1">
-                <a:solidFill>
-                  <a:srgbClr val="7F0055"/>
-                </a:solidFill>
-                <a:latin typeface="Consolas" charset="0"/>
-                <a:ea typeface="Consolas" charset="0"/>
-                <a:cs typeface="Consolas" charset="0"/>
-              </a:rPr>
-              <a:t>val</a:t>
-            </a:r>
-            <a:r>
-              <a:rPr lang="en-US" b="1" dirty="0">
-                <a:latin typeface="Consolas" charset="0"/>
-                <a:ea typeface="Consolas" charset="0"/>
-                <a:cs typeface="Consolas" charset="0"/>
-              </a:rPr>
-              <a:t> </a:t>
-            </a:r>
-            <a:r>
-              <a:rPr lang="en-US" dirty="0" err="1">
-                <a:solidFill>
-                  <a:srgbClr val="6A68FF"/>
-                </a:solidFill>
-                <a:latin typeface="Consolas" charset="0"/>
-                <a:ea typeface="Consolas" charset="0"/>
-                <a:cs typeface="Consolas" charset="0"/>
-              </a:rPr>
-              <a:t>url</a:t>
-            </a:r>
-            <a:r>
-              <a:rPr lang="en-US" dirty="0">
-                <a:latin typeface="Consolas" charset="0"/>
-                <a:ea typeface="Consolas" charset="0"/>
-                <a:cs typeface="Consolas" charset="0"/>
-              </a:rPr>
-              <a:t> = </a:t>
-            </a:r>
-            <a:r>
-              <a:rPr lang="en-US" dirty="0" err="1">
-                <a:latin typeface="Consolas" charset="0"/>
-                <a:ea typeface="Consolas" charset="0"/>
-                <a:cs typeface="Consolas" charset="0"/>
-              </a:rPr>
-              <a:t>baseUrl</a:t>
-            </a:r>
-            <a:r>
-              <a:rPr lang="en-US" dirty="0">
-                <a:latin typeface="Consolas" charset="0"/>
-                <a:ea typeface="Consolas" charset="0"/>
-                <a:cs typeface="Consolas" charset="0"/>
-              </a:rPr>
-              <a:t> + </a:t>
-            </a:r>
-            <a:r>
-              <a:rPr lang="en-US" dirty="0" err="1">
-                <a:latin typeface="Consolas" charset="0"/>
-                <a:ea typeface="Consolas" charset="0"/>
-                <a:cs typeface="Consolas" charset="0"/>
-              </a:rPr>
-              <a:t>word.replace</a:t>
-            </a:r>
-            <a:r>
-              <a:rPr lang="en-US" dirty="0">
-                <a:latin typeface="Consolas" charset="0"/>
-                <a:ea typeface="Consolas" charset="0"/>
-                <a:cs typeface="Consolas" charset="0"/>
-              </a:rPr>
-              <a:t>(</a:t>
-            </a:r>
-            <a:r>
-              <a:rPr lang="en-US" dirty="0">
-                <a:solidFill>
-                  <a:srgbClr val="0225C8"/>
-                </a:solidFill>
-                <a:latin typeface="Consolas" charset="0"/>
-                <a:ea typeface="Consolas" charset="0"/>
-                <a:cs typeface="Consolas" charset="0"/>
-              </a:rPr>
-              <a:t>" "</a:t>
-            </a:r>
-            <a:r>
-              <a:rPr lang="en-US" dirty="0">
-                <a:latin typeface="Consolas" charset="0"/>
-                <a:ea typeface="Consolas" charset="0"/>
-                <a:cs typeface="Consolas" charset="0"/>
-              </a:rPr>
-              <a:t>, </a:t>
-            </a:r>
-            <a:r>
-              <a:rPr lang="en-US" dirty="0">
-                <a:solidFill>
-                  <a:srgbClr val="0225C8"/>
-                </a:solidFill>
-                <a:latin typeface="Consolas" charset="0"/>
-                <a:ea typeface="Consolas" charset="0"/>
-                <a:cs typeface="Consolas" charset="0"/>
-              </a:rPr>
-              <a:t>"%20"</a:t>
-            </a:r>
-            <a:r>
-              <a:rPr lang="en-US" dirty="0">
-                <a:latin typeface="Consolas" charset="0"/>
-                <a:ea typeface="Consolas" charset="0"/>
-                <a:cs typeface="Consolas" charset="0"/>
-              </a:rPr>
+                <a:hlinkClick r:id="rId2"/>
+              </a:rPr>
+              <a:t>github.com/DANS-KNAW/course-scala</a:t>
+            </a:r>
+            <a:r>
+              <a:rPr lang="en-US" dirty="0" smtClean="0"/>
               <a:t>)</a:t>
             </a:r>
-            <a:br>
-              <a:rPr lang="en-US" dirty="0">
-                <a:latin typeface="Consolas" charset="0"/>
-                <a:ea typeface="Consolas" charset="0"/>
-                <a:cs typeface="Consolas" charset="0"/>
-              </a:rPr>
-            </a:br>
-            <a:r>
-              <a:rPr lang="en-US" dirty="0">
-                <a:latin typeface="Consolas" charset="0"/>
-                <a:ea typeface="Consolas" charset="0"/>
-                <a:cs typeface="Consolas" charset="0"/>
-              </a:rPr>
-              <a:t/>
-            </a:r>
-            <a:br>
-              <a:rPr lang="en-US" dirty="0">
-                <a:latin typeface="Consolas" charset="0"/>
-                <a:ea typeface="Consolas" charset="0"/>
-                <a:cs typeface="Consolas" charset="0"/>
-              </a:rPr>
-            </a:br>
-            <a:r>
-              <a:rPr lang="en-US" dirty="0">
-                <a:latin typeface="Consolas" charset="0"/>
-                <a:ea typeface="Consolas" charset="0"/>
-                <a:cs typeface="Consolas" charset="0"/>
-              </a:rPr>
-              <a:t>  </a:t>
-            </a:r>
-            <a:r>
-              <a:rPr lang="en-US" dirty="0" err="1">
-                <a:latin typeface="Consolas" charset="0"/>
-                <a:ea typeface="Consolas" charset="0"/>
-                <a:cs typeface="Consolas" charset="0"/>
-              </a:rPr>
-              <a:t>Observable.</a:t>
-            </a:r>
-            <a:r>
-              <a:rPr lang="en-US" i="1" dirty="0" err="1">
-                <a:latin typeface="Consolas" charset="0"/>
-                <a:ea typeface="Consolas" charset="0"/>
-                <a:cs typeface="Consolas" charset="0"/>
-              </a:rPr>
-              <a:t>using</a:t>
-            </a:r>
-            <a:r>
-              <a:rPr lang="en-US" dirty="0">
-                <a:latin typeface="Consolas" charset="0"/>
-                <a:ea typeface="Consolas" charset="0"/>
-                <a:cs typeface="Consolas" charset="0"/>
-              </a:rPr>
-              <a:t>(</a:t>
-            </a:r>
-            <a:r>
-              <a:rPr lang="en-US" dirty="0" err="1">
-                <a:latin typeface="Consolas" charset="0"/>
-                <a:ea typeface="Consolas" charset="0"/>
-                <a:cs typeface="Consolas" charset="0"/>
-              </a:rPr>
-              <a:t>Source.</a:t>
-            </a:r>
-            <a:r>
-              <a:rPr lang="en-US" i="1" dirty="0" err="1">
-                <a:latin typeface="Consolas" charset="0"/>
-                <a:ea typeface="Consolas" charset="0"/>
-                <a:cs typeface="Consolas" charset="0"/>
-              </a:rPr>
-              <a:t>fromURL</a:t>
-            </a:r>
-            <a:r>
-              <a:rPr lang="en-US" dirty="0">
-                <a:latin typeface="Consolas" charset="0"/>
-                <a:ea typeface="Consolas" charset="0"/>
-                <a:cs typeface="Consolas" charset="0"/>
-              </a:rPr>
-              <a:t>(</a:t>
-            </a:r>
-            <a:r>
-              <a:rPr lang="en-US" dirty="0" err="1">
-                <a:solidFill>
-                  <a:srgbClr val="6A68FF"/>
-                </a:solidFill>
-                <a:latin typeface="Consolas" charset="0"/>
-                <a:ea typeface="Consolas" charset="0"/>
-                <a:cs typeface="Consolas" charset="0"/>
-              </a:rPr>
-              <a:t>url</a:t>
-            </a:r>
-            <a:r>
-              <a:rPr lang="en-US" dirty="0">
-                <a:latin typeface="Consolas" charset="0"/>
-                <a:ea typeface="Consolas" charset="0"/>
-                <a:cs typeface="Consolas" charset="0"/>
-              </a:rPr>
-              <a:t>))(r =&gt; </a:t>
-            </a:r>
-            <a:r>
-              <a:rPr lang="en-US" dirty="0" smtClean="0">
-                <a:latin typeface="Consolas" charset="0"/>
-                <a:ea typeface="Consolas" charset="0"/>
-                <a:cs typeface="Consolas" charset="0"/>
-              </a:rPr>
-              <a:t/>
-            </a:r>
-            <a:br>
-              <a:rPr lang="en-US" dirty="0" smtClean="0">
-                <a:latin typeface="Consolas" charset="0"/>
-                <a:ea typeface="Consolas" charset="0"/>
-                <a:cs typeface="Consolas" charset="0"/>
-              </a:rPr>
-            </a:br>
-            <a:r>
-              <a:rPr lang="en-US" dirty="0" smtClean="0">
-                <a:latin typeface="Consolas" charset="0"/>
-                <a:ea typeface="Consolas" charset="0"/>
-                <a:cs typeface="Consolas" charset="0"/>
-              </a:rPr>
-              <a:t>    </a:t>
-            </a:r>
-            <a:r>
-              <a:rPr lang="en-US" dirty="0" err="1" smtClean="0">
-                <a:latin typeface="Consolas" charset="0"/>
-                <a:ea typeface="Consolas" charset="0"/>
-                <a:cs typeface="Consolas" charset="0"/>
-              </a:rPr>
-              <a:t>Observable.</a:t>
-            </a:r>
-            <a:r>
-              <a:rPr lang="en-US" i="1" dirty="0" err="1" smtClean="0">
-                <a:latin typeface="Consolas" charset="0"/>
-                <a:ea typeface="Consolas" charset="0"/>
-                <a:cs typeface="Consolas" charset="0"/>
-              </a:rPr>
-              <a:t>just</a:t>
-            </a:r>
-            <a:r>
-              <a:rPr lang="en-US" dirty="0" smtClean="0">
-                <a:latin typeface="Consolas" charset="0"/>
-                <a:ea typeface="Consolas" charset="0"/>
-                <a:cs typeface="Consolas" charset="0"/>
-              </a:rPr>
-              <a:t>(</a:t>
-            </a:r>
-            <a:r>
-              <a:rPr lang="en-US" dirty="0" err="1" smtClean="0">
-                <a:latin typeface="Consolas" charset="0"/>
-                <a:ea typeface="Consolas" charset="0"/>
-                <a:cs typeface="Consolas" charset="0"/>
-              </a:rPr>
-              <a:t>r.mkString</a:t>
-            </a:r>
-            <a:r>
-              <a:rPr lang="en-US" dirty="0">
-                <a:latin typeface="Consolas" charset="0"/>
-                <a:ea typeface="Consolas" charset="0"/>
-                <a:cs typeface="Consolas" charset="0"/>
-              </a:rPr>
-              <a:t>), _.close(), </a:t>
-            </a:r>
-            <a:r>
-              <a:rPr lang="en-US" dirty="0" err="1">
-                <a:latin typeface="Consolas" charset="0"/>
-                <a:ea typeface="Consolas" charset="0"/>
-                <a:cs typeface="Consolas" charset="0"/>
-              </a:rPr>
-              <a:t>disposeEagerly</a:t>
-            </a:r>
-            <a:r>
-              <a:rPr lang="en-US" dirty="0">
-                <a:latin typeface="Consolas" charset="0"/>
-                <a:ea typeface="Consolas" charset="0"/>
-                <a:cs typeface="Consolas" charset="0"/>
-              </a:rPr>
-              <a:t> = </a:t>
-            </a:r>
-            <a:r>
-              <a:rPr lang="en-US" b="1" dirty="0">
-                <a:solidFill>
-                  <a:srgbClr val="7F0055"/>
-                </a:solidFill>
-                <a:latin typeface="Consolas" charset="0"/>
-                <a:ea typeface="Consolas" charset="0"/>
-                <a:cs typeface="Consolas" charset="0"/>
-              </a:rPr>
-              <a:t>true</a:t>
-            </a:r>
-            <a:r>
-              <a:rPr lang="en-US" dirty="0">
-                <a:latin typeface="Consolas" charset="0"/>
-                <a:ea typeface="Consolas" charset="0"/>
-                <a:cs typeface="Consolas" charset="0"/>
-              </a:rPr>
-              <a:t>)</a:t>
-            </a:r>
-            <a:br>
-              <a:rPr lang="en-US" dirty="0">
-                <a:latin typeface="Consolas" charset="0"/>
-                <a:ea typeface="Consolas" charset="0"/>
-                <a:cs typeface="Consolas" charset="0"/>
-              </a:rPr>
-            </a:br>
-            <a:r>
-              <a:rPr lang="en-US" dirty="0">
-                <a:latin typeface="Consolas" charset="0"/>
-                <a:ea typeface="Consolas" charset="0"/>
-                <a:cs typeface="Consolas" charset="0"/>
-              </a:rPr>
-              <a:t>}</a:t>
-            </a:r>
+          </a:p>
+          <a:p>
+            <a:r>
+              <a:rPr lang="en-US" dirty="0" smtClean="0"/>
+              <a:t>Open the project in your favorite editor</a:t>
+            </a:r>
+          </a:p>
+          <a:p>
+            <a:r>
+              <a:rPr lang="en-US" dirty="0" smtClean="0"/>
+              <a:t>Create a package </a:t>
+            </a:r>
+            <a:r>
+              <a:rPr lang="en-US" dirty="0" err="1" smtClean="0"/>
+              <a:t>src</a:t>
+            </a:r>
+            <a:r>
+              <a:rPr lang="en-US" dirty="0" smtClean="0"/>
+              <a:t>/main/</a:t>
+            </a:r>
+            <a:r>
+              <a:rPr lang="en-US" dirty="0" err="1" smtClean="0"/>
+              <a:t>scala</a:t>
+            </a:r>
+            <a:r>
+              <a:rPr lang="en-US" dirty="0" smtClean="0"/>
+              <a:t>/workshop5/wiki</a:t>
+            </a:r>
+          </a:p>
+          <a:p>
+            <a:r>
+              <a:rPr lang="en-US" dirty="0" smtClean="0"/>
+              <a:t>Create a package </a:t>
+            </a:r>
+            <a:r>
+              <a:rPr lang="en-US" dirty="0" err="1" smtClean="0"/>
+              <a:t>src</a:t>
+            </a:r>
+            <a:r>
+              <a:rPr lang="en-US" dirty="0" smtClean="0"/>
+              <a:t>/test/</a:t>
+            </a:r>
+            <a:r>
+              <a:rPr lang="en-US" dirty="0" err="1" smtClean="0"/>
+              <a:t>scala</a:t>
+            </a:r>
+            <a:r>
+              <a:rPr lang="en-US" dirty="0" smtClean="0"/>
+              <a:t>/workshop5/test/wiki</a:t>
+            </a:r>
+            <a:endParaRPr lang="en-US" dirty="0"/>
           </a:p>
         </p:txBody>
       </p:sp>
     </p:spTree>
     <p:extLst>
       <p:ext uri="{BB962C8B-B14F-4D97-AF65-F5344CB8AC3E}">
-        <p14:creationId xmlns:p14="http://schemas.microsoft.com/office/powerpoint/2010/main" val="1052109087"/>
+        <p14:creationId xmlns:p14="http://schemas.microsoft.com/office/powerpoint/2010/main" val="1098940961"/>
       </p:ext>
     </p:extLst>
   </p:cSld>
@@ -7220,7 +6792,12 @@
             <p:ph idx="1"/>
           </p:nvPr>
         </p:nvSpPr>
-        <p:spPr/>
+        <p:spPr>
+          <a:xfrm>
+            <a:off x="838199" y="1825625"/>
+            <a:ext cx="11061357" cy="4351338"/>
+          </a:xfrm>
+        </p:spPr>
         <p:txBody>
           <a:bodyPr/>
           <a:lstStyle/>
@@ -7235,7 +6812,7 @@
                 <a:ea typeface="Consolas" charset="0"/>
                 <a:cs typeface="Consolas" charset="0"/>
               </a:rPr>
-              <a:t>WikipediaParseComponent</a:t>
+              <a:t>WikipediaFacadeComponent</a:t>
             </a:r>
             <a:r>
               <a:rPr lang="en-US" dirty="0" smtClean="0"/>
@@ -7247,11 +6824,15 @@
                 <a:ea typeface="Consolas" charset="0"/>
                 <a:cs typeface="Consolas" charset="0"/>
               </a:rPr>
-              <a:t>ResponseParser</a:t>
-            </a:r>
-            <a:r>
-              <a:rPr lang="en-US" dirty="0" smtClean="0"/>
-              <a:t> and its access point</a:t>
+              <a:t>WikipediaFacade</a:t>
+            </a:r>
+            <a:r>
+              <a:rPr lang="en-US" sz="2400" dirty="0" smtClean="0"/>
+              <a:t> </a:t>
+            </a:r>
+            <a:r>
+              <a:rPr lang="en-US" dirty="0" smtClean="0"/>
+              <a:t>and its access-point</a:t>
             </a:r>
           </a:p>
           <a:p>
@@ -7260,31 +6841,382 @@
               <a:t>In the </a:t>
             </a:r>
             <a:r>
+              <a:rPr lang="en-US" sz="2400" dirty="0" err="1" smtClean="0">
+                <a:latin typeface="Consolas" charset="0"/>
+                <a:ea typeface="Consolas" charset="0"/>
+                <a:cs typeface="Consolas" charset="0"/>
+              </a:rPr>
+              <a:t>WikipediaFacade</a:t>
+            </a:r>
+            <a:r>
+              <a:rPr lang="en-US" dirty="0" smtClean="0"/>
+              <a:t> define:</a:t>
+            </a:r>
+          </a:p>
+          <a:p>
+            <a:pPr lvl="1"/>
+            <a:r>
+              <a:rPr lang="en-US" dirty="0" smtClean="0"/>
+              <a:t>A value </a:t>
+            </a:r>
+            <a:r>
               <a:rPr lang="en-US" dirty="0" err="1" smtClean="0">
                 <a:latin typeface="Consolas" charset="0"/>
                 <a:ea typeface="Consolas" charset="0"/>
                 <a:cs typeface="Consolas" charset="0"/>
               </a:rPr>
-              <a:t>ResponseParser</a:t>
-            </a:r>
-            <a:r>
-              <a:rPr lang="en-US" dirty="0"/>
-              <a:t>, create an abstract </a:t>
-            </a:r>
-            <a:r>
-              <a:rPr lang="en-US" dirty="0" smtClean="0"/>
-              <a:t>function</a:t>
+              <a:t>baseUrl</a:t>
+            </a:r>
+            <a:r>
+              <a:rPr lang="en-US" dirty="0" smtClean="0">
+                <a:latin typeface="Consolas" charset="0"/>
+                <a:ea typeface="Consolas" charset="0"/>
+                <a:cs typeface="Consolas" charset="0"/>
+              </a:rPr>
+              <a:t>: String</a:t>
+            </a:r>
+            <a:r>
+              <a:rPr lang="en-US" dirty="0" smtClean="0"/>
+              <a:t> (do not assign it here)</a:t>
+            </a:r>
+          </a:p>
+          <a:p>
+            <a:pPr lvl="1"/>
+            <a:r>
+              <a:rPr lang="en-US" dirty="0" smtClean="0"/>
+              <a:t>A method </a:t>
+            </a:r>
+            <a:r>
+              <a:rPr lang="en-US" dirty="0" smtClean="0">
+                <a:latin typeface="Consolas" charset="0"/>
+                <a:ea typeface="Consolas" charset="0"/>
+                <a:cs typeface="Consolas" charset="0"/>
+              </a:rPr>
+              <a:t>search(word: String): Observable[String]</a:t>
+            </a:r>
+            <a:r>
+              <a:rPr lang="en-US" dirty="0" smtClean="0">
+                <a:ea typeface="Consolas" charset="0"/>
+                <a:cs typeface="Consolas" charset="0"/>
+              </a:rPr>
+              <a:t> with the following implementation:</a:t>
+            </a:r>
+            <a:endParaRPr lang="en-US" dirty="0" smtClean="0">
+              <a:latin typeface="Consolas" charset="0"/>
+              <a:ea typeface="Consolas" charset="0"/>
+              <a:cs typeface="Consolas" charset="0"/>
+            </a:endParaRPr>
+          </a:p>
+          <a:p>
+            <a:pPr marL="914400" lvl="2" indent="0">
+              <a:buNone/>
+            </a:pPr>
+            <a:r>
+              <a:rPr lang="en-US" dirty="0" err="1">
+                <a:latin typeface="Consolas" charset="0"/>
+                <a:ea typeface="Consolas" charset="0"/>
+                <a:cs typeface="Consolas" charset="0"/>
+              </a:rPr>
+              <a:t>Observable.</a:t>
+            </a:r>
+            <a:r>
+              <a:rPr lang="en-US" i="1" dirty="0" err="1">
+                <a:latin typeface="Consolas" charset="0"/>
+                <a:ea typeface="Consolas" charset="0"/>
+                <a:cs typeface="Consolas" charset="0"/>
+              </a:rPr>
+              <a:t>defer</a:t>
+            </a:r>
+            <a:r>
+              <a:rPr lang="en-US" i="1" dirty="0">
+                <a:latin typeface="Consolas" charset="0"/>
+                <a:ea typeface="Consolas" charset="0"/>
+                <a:cs typeface="Consolas" charset="0"/>
+              </a:rPr>
+              <a:t> </a:t>
+            </a:r>
+            <a:r>
+              <a:rPr lang="en-US" dirty="0">
+                <a:latin typeface="Consolas" charset="0"/>
+                <a:ea typeface="Consolas" charset="0"/>
+                <a:cs typeface="Consolas" charset="0"/>
+              </a:rPr>
+              <a:t>{</a:t>
             </a:r>
             <a:br>
-              <a:rPr lang="en-US" dirty="0" smtClean="0"/>
+              <a:rPr lang="en-US" dirty="0">
+                <a:latin typeface="Consolas" charset="0"/>
+                <a:ea typeface="Consolas" charset="0"/>
+                <a:cs typeface="Consolas" charset="0"/>
+              </a:rPr>
             </a:br>
             <a:r>
+              <a:rPr lang="en-US" dirty="0">
+                <a:latin typeface="Consolas" charset="0"/>
+                <a:ea typeface="Consolas" charset="0"/>
+                <a:cs typeface="Consolas" charset="0"/>
+              </a:rPr>
+              <a:t>  </a:t>
+            </a:r>
+            <a:r>
+              <a:rPr lang="en-US" b="1" dirty="0" err="1">
+                <a:solidFill>
+                  <a:srgbClr val="7F0055"/>
+                </a:solidFill>
+                <a:latin typeface="Consolas" charset="0"/>
+                <a:ea typeface="Consolas" charset="0"/>
+                <a:cs typeface="Consolas" charset="0"/>
+              </a:rPr>
+              <a:t>val</a:t>
+            </a:r>
+            <a:r>
+              <a:rPr lang="en-US" b="1" dirty="0">
+                <a:latin typeface="Consolas" charset="0"/>
+                <a:ea typeface="Consolas" charset="0"/>
+                <a:cs typeface="Consolas" charset="0"/>
+              </a:rPr>
+              <a:t> </a:t>
+            </a:r>
+            <a:r>
+              <a:rPr lang="en-US" dirty="0" err="1">
+                <a:solidFill>
+                  <a:srgbClr val="6A68FF"/>
+                </a:solidFill>
+                <a:latin typeface="Consolas" charset="0"/>
+                <a:ea typeface="Consolas" charset="0"/>
+                <a:cs typeface="Consolas" charset="0"/>
+              </a:rPr>
+              <a:t>url</a:t>
+            </a:r>
+            <a:r>
+              <a:rPr lang="en-US" dirty="0">
+                <a:latin typeface="Consolas" charset="0"/>
+                <a:ea typeface="Consolas" charset="0"/>
+                <a:cs typeface="Consolas" charset="0"/>
+              </a:rPr>
+              <a:t> = </a:t>
+            </a:r>
+            <a:r>
+              <a:rPr lang="en-US" dirty="0" err="1">
+                <a:latin typeface="Consolas" charset="0"/>
+                <a:ea typeface="Consolas" charset="0"/>
+                <a:cs typeface="Consolas" charset="0"/>
+              </a:rPr>
+              <a:t>baseUrl</a:t>
+            </a:r>
+            <a:r>
+              <a:rPr lang="en-US" dirty="0">
+                <a:latin typeface="Consolas" charset="0"/>
+                <a:ea typeface="Consolas" charset="0"/>
+                <a:cs typeface="Consolas" charset="0"/>
+              </a:rPr>
+              <a:t> + </a:t>
+            </a:r>
+            <a:r>
+              <a:rPr lang="en-US" dirty="0" err="1">
+                <a:latin typeface="Consolas" charset="0"/>
+                <a:ea typeface="Consolas" charset="0"/>
+                <a:cs typeface="Consolas" charset="0"/>
+              </a:rPr>
+              <a:t>word.replace</a:t>
+            </a:r>
+            <a:r>
+              <a:rPr lang="en-US" dirty="0">
+                <a:latin typeface="Consolas" charset="0"/>
+                <a:ea typeface="Consolas" charset="0"/>
+                <a:cs typeface="Consolas" charset="0"/>
+              </a:rPr>
+              <a:t>(</a:t>
+            </a:r>
+            <a:r>
+              <a:rPr lang="en-US" dirty="0">
+                <a:solidFill>
+                  <a:srgbClr val="0225C8"/>
+                </a:solidFill>
+                <a:latin typeface="Consolas" charset="0"/>
+                <a:ea typeface="Consolas" charset="0"/>
+                <a:cs typeface="Consolas" charset="0"/>
+              </a:rPr>
+              <a:t>" "</a:t>
+            </a:r>
+            <a:r>
+              <a:rPr lang="en-US" dirty="0">
+                <a:latin typeface="Consolas" charset="0"/>
+                <a:ea typeface="Consolas" charset="0"/>
+                <a:cs typeface="Consolas" charset="0"/>
+              </a:rPr>
+              <a:t>, </a:t>
+            </a:r>
+            <a:r>
+              <a:rPr lang="en-US" dirty="0">
+                <a:solidFill>
+                  <a:srgbClr val="0225C8"/>
+                </a:solidFill>
+                <a:latin typeface="Consolas" charset="0"/>
+                <a:ea typeface="Consolas" charset="0"/>
+                <a:cs typeface="Consolas" charset="0"/>
+              </a:rPr>
+              <a:t>"%20"</a:t>
+            </a:r>
+            <a:r>
+              <a:rPr lang="en-US" dirty="0">
+                <a:latin typeface="Consolas" charset="0"/>
+                <a:ea typeface="Consolas" charset="0"/>
+                <a:cs typeface="Consolas" charset="0"/>
+              </a:rPr>
+              <a:t>)</a:t>
+            </a:r>
+            <a:br>
+              <a:rPr lang="en-US" dirty="0">
+                <a:latin typeface="Consolas" charset="0"/>
+                <a:ea typeface="Consolas" charset="0"/>
+                <a:cs typeface="Consolas" charset="0"/>
+              </a:rPr>
+            </a:br>
+            <a:r>
+              <a:rPr lang="en-US" dirty="0">
+                <a:latin typeface="Consolas" charset="0"/>
+                <a:ea typeface="Consolas" charset="0"/>
+                <a:cs typeface="Consolas" charset="0"/>
+              </a:rPr>
+              <a:t/>
+            </a:r>
+            <a:br>
+              <a:rPr lang="en-US" dirty="0">
+                <a:latin typeface="Consolas" charset="0"/>
+                <a:ea typeface="Consolas" charset="0"/>
+                <a:cs typeface="Consolas" charset="0"/>
+              </a:rPr>
+            </a:br>
+            <a:r>
+              <a:rPr lang="en-US" dirty="0">
+                <a:latin typeface="Consolas" charset="0"/>
+                <a:ea typeface="Consolas" charset="0"/>
+                <a:cs typeface="Consolas" charset="0"/>
+              </a:rPr>
+              <a:t>  </a:t>
+            </a:r>
+            <a:r>
+              <a:rPr lang="en-US" dirty="0" err="1">
+                <a:latin typeface="Consolas" charset="0"/>
+                <a:ea typeface="Consolas" charset="0"/>
+                <a:cs typeface="Consolas" charset="0"/>
+              </a:rPr>
+              <a:t>Observable.</a:t>
+            </a:r>
+            <a:r>
+              <a:rPr lang="en-US" i="1" dirty="0" err="1">
+                <a:latin typeface="Consolas" charset="0"/>
+                <a:ea typeface="Consolas" charset="0"/>
+                <a:cs typeface="Consolas" charset="0"/>
+              </a:rPr>
+              <a:t>using</a:t>
+            </a:r>
+            <a:r>
+              <a:rPr lang="en-US" dirty="0">
+                <a:latin typeface="Consolas" charset="0"/>
+                <a:ea typeface="Consolas" charset="0"/>
+                <a:cs typeface="Consolas" charset="0"/>
+              </a:rPr>
+              <a:t>(</a:t>
+            </a:r>
+            <a:r>
+              <a:rPr lang="en-US" dirty="0" err="1">
+                <a:latin typeface="Consolas" charset="0"/>
+                <a:ea typeface="Consolas" charset="0"/>
+                <a:cs typeface="Consolas" charset="0"/>
+              </a:rPr>
+              <a:t>Source.</a:t>
+            </a:r>
+            <a:r>
+              <a:rPr lang="en-US" i="1" dirty="0" err="1">
+                <a:latin typeface="Consolas" charset="0"/>
+                <a:ea typeface="Consolas" charset="0"/>
+                <a:cs typeface="Consolas" charset="0"/>
+              </a:rPr>
+              <a:t>fromURL</a:t>
+            </a:r>
+            <a:r>
+              <a:rPr lang="en-US" dirty="0">
+                <a:latin typeface="Consolas" charset="0"/>
+                <a:ea typeface="Consolas" charset="0"/>
+                <a:cs typeface="Consolas" charset="0"/>
+              </a:rPr>
+              <a:t>(</a:t>
+            </a:r>
+            <a:r>
+              <a:rPr lang="en-US" dirty="0" err="1">
+                <a:solidFill>
+                  <a:srgbClr val="6A68FF"/>
+                </a:solidFill>
+                <a:latin typeface="Consolas" charset="0"/>
+                <a:ea typeface="Consolas" charset="0"/>
+                <a:cs typeface="Consolas" charset="0"/>
+              </a:rPr>
+              <a:t>url</a:t>
+            </a:r>
+            <a:r>
+              <a:rPr lang="en-US" dirty="0">
+                <a:latin typeface="Consolas" charset="0"/>
+                <a:ea typeface="Consolas" charset="0"/>
+                <a:cs typeface="Consolas" charset="0"/>
+              </a:rPr>
+              <a:t>))(r =&gt; </a:t>
+            </a:r>
+            <a:r>
               <a:rPr lang="en-US" dirty="0" smtClean="0">
                 <a:latin typeface="Consolas" charset="0"/>
                 <a:ea typeface="Consolas" charset="0"/>
                 <a:cs typeface="Consolas" charset="0"/>
               </a:rPr>
-              <a:t>parse(input</a:t>
+              <a:t/>
+            </a:r>
+            <a:br>
+              <a:rPr lang="en-US" dirty="0" smtClean="0">
+                <a:latin typeface="Consolas" charset="0"/>
+                <a:ea typeface="Consolas" charset="0"/>
+                <a:cs typeface="Consolas" charset="0"/>
+              </a:rPr>
+            </a:br>
+            <a:r>
+              <a:rPr lang="en-US" dirty="0" smtClean="0">
+                <a:latin typeface="Consolas" charset="0"/>
+                <a:ea typeface="Consolas" charset="0"/>
+                <a:cs typeface="Consolas" charset="0"/>
+              </a:rPr>
+              <a:t>    </a:t>
+            </a:r>
+            <a:r>
+              <a:rPr lang="en-US" dirty="0" err="1" smtClean="0">
+                <a:latin typeface="Consolas" charset="0"/>
+                <a:ea typeface="Consolas" charset="0"/>
+                <a:cs typeface="Consolas" charset="0"/>
+              </a:rPr>
+              <a:t>Observable.</a:t>
+            </a:r>
+            <a:r>
+              <a:rPr lang="en-US" i="1" dirty="0" err="1" smtClean="0">
+                <a:latin typeface="Consolas" charset="0"/>
+                <a:ea typeface="Consolas" charset="0"/>
+                <a:cs typeface="Consolas" charset="0"/>
+              </a:rPr>
+              <a:t>just</a:t>
+            </a:r>
+            <a:r>
+              <a:rPr lang="en-US" dirty="0" smtClean="0">
+                <a:latin typeface="Consolas" charset="0"/>
+                <a:ea typeface="Consolas" charset="0"/>
+                <a:cs typeface="Consolas" charset="0"/>
+              </a:rPr>
+              <a:t>(</a:t>
+            </a:r>
+            <a:r>
+              <a:rPr lang="en-US" dirty="0" err="1" smtClean="0">
+                <a:latin typeface="Consolas" charset="0"/>
+                <a:ea typeface="Consolas" charset="0"/>
+                <a:cs typeface="Consolas" charset="0"/>
+              </a:rPr>
+              <a:t>r.mkString</a:t>
             </a:r>
             <a:r>
               <a:rPr lang="en-US" dirty="0">
@@ -7292,7 +7224,7 @@
                 <a:ea typeface="Consolas" charset="0"/>
                 <a:cs typeface="Consolas" charset="0"/>
               </a:rPr>
-              <a:t>: String): </a:t>
+              <a:t>), _.close(), </a:t>
             </a:r>
             <a:r>
               <a:rPr lang="en-US" dirty="0" err="1">
@@ -7300,7 +7232,7 @@
                 <a:ea typeface="Consolas" charset="0"/>
                 <a:cs typeface="Consolas" charset="0"/>
               </a:rPr>
-              <a:t>Seq</a:t>
+              <a:t>disposeEagerly</a:t>
             </a:r>
             <a:r>
               <a:rPr lang="en-US" dirty="0">
@@ -7308,26 +7240,49 @@
                 <a:ea typeface="Consolas" charset="0"/>
                 <a:cs typeface="Consolas" charset="0"/>
               </a:rPr>
-              <a:t>[String</a:t>
-            </a:r>
-            <a:r>
-              <a:rPr lang="en-US" dirty="0" smtClean="0">
-                <a:latin typeface="Consolas" charset="0"/>
-                <a:ea typeface="Consolas" charset="0"/>
-                <a:cs typeface="Consolas" charset="0"/>
-              </a:rPr>
-              <a:t>]</a:t>
-            </a:r>
-          </a:p>
-          <a:p>
-            <a:endParaRPr lang="en-US" dirty="0"/>
+              <a:t> = </a:t>
+            </a:r>
+            <a:r>
+              <a:rPr lang="en-US" b="1" dirty="0">
+                <a:solidFill>
+                  <a:srgbClr val="7F0055"/>
+                </a:solidFill>
+                <a:latin typeface="Consolas" charset="0"/>
+                <a:ea typeface="Consolas" charset="0"/>
+                <a:cs typeface="Consolas" charset="0"/>
+              </a:rPr>
+              <a:t>true</a:t>
+            </a:r>
+            <a:r>
+              <a:rPr lang="en-US" dirty="0">
+                <a:latin typeface="Consolas" charset="0"/>
+                <a:ea typeface="Consolas" charset="0"/>
+                <a:cs typeface="Consolas" charset="0"/>
+              </a:rPr>
+              <a:t>)</a:t>
+            </a:r>
+            <a:br>
+              <a:rPr lang="en-US" dirty="0">
+                <a:latin typeface="Consolas" charset="0"/>
+                <a:ea typeface="Consolas" charset="0"/>
+                <a:cs typeface="Consolas" charset="0"/>
+              </a:rPr>
+            </a:br>
+            <a:r>
+              <a:rPr lang="en-US" dirty="0">
+                <a:latin typeface="Consolas" charset="0"/>
+                <a:ea typeface="Consolas" charset="0"/>
+                <a:cs typeface="Consolas" charset="0"/>
+              </a:rPr>
+              <a:t>}</a:t>
+            </a:r>
           </a:p>
         </p:txBody>
       </p:sp>
     </p:spTree>
     <p:extLst>
       <p:ext uri="{BB962C8B-B14F-4D97-AF65-F5344CB8AC3E}">
-        <p14:creationId xmlns:p14="http://schemas.microsoft.com/office/powerpoint/2010/main" val="229912161"/>
+        <p14:creationId xmlns:p14="http://schemas.microsoft.com/office/powerpoint/2010/main" val="1052109087"/>
       </p:ext>
     </p:extLst>
   </p:cSld>
@@ -7402,17 +7357,13 @@
                 <a:ea typeface="Consolas" charset="0"/>
                 <a:cs typeface="Consolas" charset="0"/>
               </a:rPr>
-              <a:t>WikipediaParseXmlComponent</a:t>
+              <a:t>WikipediaParseComponent</a:t>
             </a:r>
             <a:r>
               <a:rPr lang="en-US" dirty="0" smtClean="0"/>
               <a:t> with a </a:t>
             </a:r>
             <a:r>
-              <a:rPr lang="en-US" dirty="0" err="1" smtClean="0"/>
-              <a:t>Xml</a:t>
-            </a:r>
-            <a:r>
               <a:rPr lang="en-US" dirty="0" err="1" smtClean="0">
                 <a:latin typeface="Consolas" charset="0"/>
                 <a:ea typeface="Consolas" charset="0"/>
@@ -7422,21 +7373,13 @@
             </a:r>
             <a:r>
               <a:rPr lang="en-US" dirty="0" smtClean="0"/>
-              <a:t> and </a:t>
-            </a:r>
-            <a:r>
-              <a:rPr lang="en-US" b="1" dirty="0" smtClean="0"/>
-              <a:t>NO</a:t>
-            </a:r>
-            <a:r>
-              <a:rPr lang="en-US" dirty="0" smtClean="0"/>
-              <a:t> access point</a:t>
-            </a:r>
-          </a:p>
-          <a:p>
-            <a:r>
-              <a:rPr lang="en-US" dirty="0" smtClean="0"/>
-              <a:t>Let them extend the </a:t>
+              <a:t> and its access point</a:t>
+            </a:r>
+          </a:p>
+          <a:p>
+            <a:r>
+              <a:rPr lang="en-US" dirty="0" smtClean="0"/>
+              <a:t>In the </a:t>
             </a:r>
             <a:r>
               <a:rPr lang="en-US" dirty="0" err="1" smtClean="0">
@@ -7444,63 +7387,26 @@
                 <a:ea typeface="Consolas" charset="0"/>
                 <a:cs typeface="Consolas" charset="0"/>
               </a:rPr>
-              <a:t>WikipediaParseComponent</a:t>
-            </a:r>
-            <a:r>
-              <a:rPr lang="en-US" dirty="0" smtClean="0"/>
-              <a:t> and </a:t>
-            </a:r>
-            <a:r>
-              <a:rPr lang="en-US" dirty="0" err="1" smtClean="0">
-                <a:latin typeface="Consolas" charset="0"/>
-                <a:ea typeface="Consolas" charset="0"/>
-                <a:cs typeface="Consolas" charset="0"/>
-              </a:rPr>
               <a:t>ResponseParser</a:t>
             </a:r>
             <a:r>
-              <a:rPr lang="en-US" dirty="0" smtClean="0"/>
-              <a:t>. This way you get the access point from the parent component.</a:t>
-            </a:r>
-          </a:p>
-          <a:p>
-            <a:r>
-              <a:rPr lang="en-US" dirty="0" smtClean="0"/>
-              <a:t>Implement the </a:t>
-            </a:r>
+              <a:rPr lang="en-US" dirty="0"/>
+              <a:t>, create an abstract </a:t>
+            </a:r>
+            <a:r>
+              <a:rPr lang="en-US" dirty="0" smtClean="0"/>
+              <a:t>function</a:t>
+            </a:r>
+            <a:br>
+              <a:rPr lang="en-US" dirty="0" smtClean="0"/>
+            </a:br>
             <a:r>
               <a:rPr lang="en-US" dirty="0" smtClean="0">
                 <a:latin typeface="Consolas" charset="0"/>
                 <a:ea typeface="Consolas" charset="0"/>
                 <a:cs typeface="Consolas" charset="0"/>
               </a:rPr>
-              <a:t>parse</a:t>
-            </a:r>
-            <a:r>
-              <a:rPr lang="en-US" dirty="0" smtClean="0"/>
-              <a:t> function:</a:t>
-            </a:r>
-          </a:p>
-          <a:p>
-            <a:pPr lvl="1"/>
-            <a:r>
-              <a:rPr lang="en-US" b="1" dirty="0">
-                <a:solidFill>
-                  <a:srgbClr val="7F0055"/>
-                </a:solidFill>
-                <a:latin typeface="Consolas" charset="0"/>
-                <a:ea typeface="Consolas" charset="0"/>
-                <a:cs typeface="Consolas" charset="0"/>
-              </a:rPr>
-              <a:t>for</a:t>
-            </a:r>
-            <a:r>
-              <a:rPr lang="en-US" b="1" dirty="0">
-                <a:latin typeface="Consolas" charset="0"/>
-                <a:ea typeface="Consolas" charset="0"/>
-                <a:cs typeface="Consolas" charset="0"/>
-              </a:rPr>
-              <a:t> </a:t>
+              <a:t>parse(input</a:t>
             </a:r>
             <a:r>
               <a:rPr lang="en-US" dirty="0">
@@ -7508,150 +7414,42 @@
                 <a:ea typeface="Consolas" charset="0"/>
                 <a:cs typeface="Consolas" charset="0"/>
               </a:rPr>
-              <a:t>{</a:t>
-            </a:r>
-            <a:br>
+              <a:t>: String): </a:t>
+            </a:r>
+            <a:r>
+              <a:rPr lang="en-US" dirty="0" err="1">
+                <a:latin typeface="Consolas" charset="0"/>
+                <a:ea typeface="Consolas" charset="0"/>
+                <a:cs typeface="Consolas" charset="0"/>
+              </a:rPr>
+              <a:t>Seq</a:t>
+            </a:r>
+            <a:r>
               <a:rPr lang="en-US" dirty="0">
                 <a:latin typeface="Consolas" charset="0"/>
                 <a:ea typeface="Consolas" charset="0"/>
                 <a:cs typeface="Consolas" charset="0"/>
               </a:rPr>
-            </a:br>
-            <a:r>
-              <a:rPr lang="en-US" dirty="0">
-                <a:latin typeface="Consolas" charset="0"/>
-                <a:ea typeface="Consolas" charset="0"/>
-                <a:cs typeface="Consolas" charset="0"/>
-              </a:rPr>
-              <a:t>  item &lt;- </a:t>
-            </a:r>
-            <a:r>
-              <a:rPr lang="en-US" dirty="0" err="1">
-                <a:latin typeface="Consolas" charset="0"/>
-                <a:ea typeface="Consolas" charset="0"/>
-                <a:cs typeface="Consolas" charset="0"/>
-              </a:rPr>
-              <a:t>XML.loadString</a:t>
-            </a:r>
-            <a:r>
-              <a:rPr lang="en-US" dirty="0">
-                <a:latin typeface="Consolas" charset="0"/>
-                <a:ea typeface="Consolas" charset="0"/>
-                <a:cs typeface="Consolas" charset="0"/>
-              </a:rPr>
-              <a:t>(xml) \ </a:t>
-            </a:r>
-            <a:r>
-              <a:rPr lang="en-US" dirty="0">
-                <a:solidFill>
-                  <a:srgbClr val="0225C8"/>
-                </a:solidFill>
-                <a:latin typeface="Consolas" charset="0"/>
-                <a:ea typeface="Consolas" charset="0"/>
-                <a:cs typeface="Consolas" charset="0"/>
-              </a:rPr>
-              <a:t>"Section"</a:t>
-            </a:r>
-            <a:r>
-              <a:rPr lang="en-US" dirty="0">
-                <a:latin typeface="Consolas" charset="0"/>
-                <a:ea typeface="Consolas" charset="0"/>
-                <a:cs typeface="Consolas" charset="0"/>
-              </a:rPr>
-              <a:t> \ </a:t>
-            </a:r>
-            <a:r>
-              <a:rPr lang="en-US" dirty="0">
-                <a:solidFill>
-                  <a:srgbClr val="0225C8"/>
-                </a:solidFill>
-                <a:latin typeface="Consolas" charset="0"/>
-                <a:ea typeface="Consolas" charset="0"/>
-                <a:cs typeface="Consolas" charset="0"/>
-              </a:rPr>
-              <a:t>"Item"</a:t>
-            </a:r>
-            <a:r>
-              <a:rPr lang="en-US" dirty="0">
-                <a:latin typeface="Consolas" charset="0"/>
-                <a:ea typeface="Consolas" charset="0"/>
-                <a:cs typeface="Consolas" charset="0"/>
-              </a:rPr>
-              <a:t/>
-            </a:r>
-            <a:br>
-              <a:rPr lang="en-US" dirty="0">
-                <a:latin typeface="Consolas" charset="0"/>
-                <a:ea typeface="Consolas" charset="0"/>
-                <a:cs typeface="Consolas" charset="0"/>
-              </a:rPr>
-            </a:br>
-            <a:r>
-              <a:rPr lang="en-US" dirty="0">
-                <a:latin typeface="Consolas" charset="0"/>
-                <a:ea typeface="Consolas" charset="0"/>
-                <a:cs typeface="Consolas" charset="0"/>
-              </a:rPr>
-              <a:t>} </a:t>
-            </a:r>
-            <a:r>
-              <a:rPr lang="en-US" b="1" dirty="0">
-                <a:solidFill>
-                  <a:srgbClr val="7F0055"/>
-                </a:solidFill>
-                <a:latin typeface="Consolas" charset="0"/>
-                <a:ea typeface="Consolas" charset="0"/>
-                <a:cs typeface="Consolas" charset="0"/>
-              </a:rPr>
-              <a:t>yield</a:t>
-            </a:r>
-            <a:r>
-              <a:rPr lang="en-US" b="1" dirty="0">
-                <a:latin typeface="Consolas" charset="0"/>
-                <a:ea typeface="Consolas" charset="0"/>
-                <a:cs typeface="Consolas" charset="0"/>
-              </a:rPr>
-              <a:t> </a:t>
-            </a:r>
-            <a:r>
-              <a:rPr lang="en-US" dirty="0">
-                <a:latin typeface="Consolas" charset="0"/>
-                <a:ea typeface="Consolas" charset="0"/>
-                <a:cs typeface="Consolas" charset="0"/>
-              </a:rPr>
-              <a:t>(item \ </a:t>
-            </a:r>
-            <a:r>
-              <a:rPr lang="en-US" dirty="0">
-                <a:solidFill>
-                  <a:srgbClr val="0225C8"/>
-                </a:solidFill>
-                <a:latin typeface="Consolas" charset="0"/>
-                <a:ea typeface="Consolas" charset="0"/>
-                <a:cs typeface="Consolas" charset="0"/>
-              </a:rPr>
-              <a:t>"Text"</a:t>
-            </a:r>
-            <a:r>
-              <a:rPr lang="en-US" dirty="0">
-                <a:latin typeface="Consolas" charset="0"/>
-                <a:ea typeface="Consolas" charset="0"/>
-                <a:cs typeface="Consolas" charset="0"/>
-              </a:rPr>
-              <a:t>).text</a:t>
-            </a:r>
-            <a:endParaRPr lang="en-US" dirty="0" smtClean="0">
-              <a:latin typeface="Consolas" charset="0"/>
-              <a:ea typeface="Consolas" charset="0"/>
-              <a:cs typeface="Consolas" charset="0"/>
-            </a:endParaRPr>
+              <a:t>[String</a:t>
+            </a:r>
+            <a:r>
+              <a:rPr lang="en-US" dirty="0" smtClean="0">
+                <a:latin typeface="Consolas" charset="0"/>
+                <a:ea typeface="Consolas" charset="0"/>
+                <a:cs typeface="Consolas" charset="0"/>
+              </a:rPr>
+              <a:t>]</a:t>
+            </a:r>
+          </a:p>
+          <a:p>
+            <a:endParaRPr lang="en-US" dirty="0"/>
           </a:p>
         </p:txBody>
       </p:sp>
     </p:spTree>
     <p:extLst>
       <p:ext uri="{BB962C8B-B14F-4D97-AF65-F5344CB8AC3E}">
-        <p14:creationId xmlns:p14="http://schemas.microsoft.com/office/powerpoint/2010/main" val="1807395067"/>
+        <p14:creationId xmlns:p14="http://schemas.microsoft.com/office/powerpoint/2010/main" val="229912161"/>
       </p:ext>
     </p:extLst>
   </p:cSld>
@@ -7932,7 +7730,7 @@
                 <a:ea typeface="Consolas" charset="0"/>
                 <a:cs typeface="Consolas" charset="0"/>
               </a:rPr>
-              <a:t>WikipediaParseJsonComponent</a:t>
+              <a:t>WikipediaParseXmlComponent</a:t>
             </a:r>
             <a:r>
               <a:rPr lang="en-US" dirty="0" smtClean="0"/>
@@ -7940,7 +7738,7 @@
             </a:r>
             <a:r>
               <a:rPr lang="en-US" dirty="0" err="1" smtClean="0"/>
-              <a:t>Json</a:t>
+              <a:t>Xml</a:t>
             </a:r>
             <a:r>
               <a:rPr lang="en-US" dirty="0" err="1" smtClean="0">
@@ -7990,7 +7788,7 @@
             </a:r>
             <a:r>
               <a:rPr lang="en-US" dirty="0" smtClean="0"/>
-              <a:t>.</a:t>
+              <a:t>. This way you get the access point from the parent component.</a:t>
             </a:r>
           </a:p>
           <a:p>
@@ -8022,7 +7820,15 @@
                 <a:ea typeface="Consolas" charset="0"/>
                 <a:cs typeface="Consolas" charset="0"/>
               </a:rPr>
-              <a:t>for </a:t>
+              <a:t>for</a:t>
+            </a:r>
+            <a:r>
+              <a:rPr lang="en-US" b="1" dirty="0">
+                <a:latin typeface="Consolas" charset="0"/>
+                <a:ea typeface="Consolas" charset="0"/>
+                <a:cs typeface="Consolas" charset="0"/>
+              </a:rPr>
+              <a:t> </a:t>
             </a:r>
             <a:r>
               <a:rPr lang="en-US" dirty="0">
@@ -8045,15 +7851,15 @@
                 <a:ea typeface="Consolas" charset="0"/>
                 <a:cs typeface="Consolas" charset="0"/>
               </a:rPr>
-              <a:t>  </a:t>
-            </a:r>
-            <a:r>
-              <a:rPr lang="en-US" i="1" dirty="0" err="1">
-                <a:latin typeface="Consolas" charset="0"/>
-                <a:ea typeface="Consolas" charset="0"/>
-                <a:cs typeface="Consolas" charset="0"/>
-              </a:rPr>
-              <a:t>JArray</a:t>
+              <a:t>  item &lt;- </a:t>
+            </a:r>
+            <a:r>
+              <a:rPr lang="en-US" dirty="0" err="1">
+                <a:latin typeface="Consolas" charset="0"/>
+                <a:ea typeface="Consolas" charset="0"/>
+                <a:cs typeface="Consolas" charset="0"/>
+              </a:rPr>
+              <a:t>XML.loadString</a:t>
             </a:r>
             <a:r>
               <a:rPr lang="en-US" dirty="0">
@@ -8061,31 +7867,18 @@
                 <a:ea typeface="Consolas" charset="0"/>
                 <a:cs typeface="Consolas" charset="0"/>
               </a:rPr>
-              <a:t>(child) &lt;- </a:t>
-            </a:r>
-            <a:r>
-              <a:rPr lang="en-US" dirty="0" err="1">
-                <a:latin typeface="Consolas" charset="0"/>
-                <a:ea typeface="Consolas" charset="0"/>
-                <a:cs typeface="Consolas" charset="0"/>
-              </a:rPr>
-              <a:t>JsonMethods.parse</a:t>
+              <a:t>(xml) \ </a:t>
             </a:r>
             <a:r>
               <a:rPr lang="en-US" dirty="0">
-                <a:latin typeface="Consolas" charset="0"/>
-                <a:ea typeface="Consolas" charset="0"/>
-                <a:cs typeface="Consolas" charset="0"/>
-              </a:rPr>
-              <a:t>(</a:t>
-            </a:r>
-            <a:r>
-              <a:rPr lang="en-US" dirty="0" err="1">
-                <a:latin typeface="Consolas" charset="0"/>
-                <a:ea typeface="Consolas" charset="0"/>
-                <a:cs typeface="Consolas" charset="0"/>
-              </a:rPr>
-              <a:t>json</a:t>
+                <a:solidFill>
+                  <a:srgbClr val="0225C8"/>
+                </a:solidFill>
+                <a:latin typeface="Consolas" charset="0"/>
+                <a:ea typeface="Consolas" charset="0"/>
+                <a:cs typeface="Consolas" charset="0"/>
+              </a:rPr>
+              <a:t>"Section"</a:t>
             </a:r>
             <a:r>
               <a:rPr lang="en-US" dirty="0">
@@ -8093,18 +7886,18 @@
                 <a:ea typeface="Consolas" charset="0"/>
                 <a:cs typeface="Consolas" charset="0"/>
               </a:rPr>
-              <a:t>)(</a:t>
+              <a:t> \ </a:t>
             </a:r>
             <a:r>
               <a:rPr lang="en-US" dirty="0">
                 <a:solidFill>
-                  <a:srgbClr val="C48CFF"/>
-                </a:solidFill>
-                <a:latin typeface="Consolas" charset="0"/>
-                <a:ea typeface="Consolas" charset="0"/>
-                <a:cs typeface="Consolas" charset="0"/>
-              </a:rPr>
-              <a:t>1</a:t>
+                  <a:srgbClr val="0225C8"/>
+                </a:solidFill>
+                <a:latin typeface="Consolas" charset="0"/>
+                <a:ea typeface="Consolas" charset="0"/>
+                <a:cs typeface="Consolas" charset="0"/>
+              </a:rPr>
+              <a:t>"Item"</a:t>
             </a:r>
             <a:r>
               <a:rPr lang="en-US" dirty="0">
@@ -8112,7 +7905,7 @@
                 <a:ea typeface="Consolas" charset="0"/>
                 <a:cs typeface="Consolas" charset="0"/>
               </a:rPr>
-              <a:t>)</a:t>
+              <a:t/>
             </a:r>
             <a:br>
               <a:rPr lang="en-US" dirty="0">
@@ -8127,15 +7920,26 @@
                 <a:ea typeface="Consolas" charset="0"/>
                 <a:cs typeface="Consolas" charset="0"/>
               </a:rPr>
-              <a:t>  </a:t>
-            </a:r>
-            <a:r>
-              <a:rPr lang="en-US" i="1" dirty="0" err="1">
-                <a:latin typeface="Consolas" charset="0"/>
-                <a:ea typeface="Consolas" charset="0"/>
-                <a:cs typeface="Consolas" charset="0"/>
-              </a:rPr>
-              <a:t>JString</a:t>
+              <a:t>} </a:t>
+            </a:r>
+            <a:r>
+              <a:rPr lang="en-US" b="1" dirty="0">
+                <a:solidFill>
+                  <a:srgbClr val="7F0055"/>
+                </a:solidFill>
+                <a:latin typeface="Consolas" charset="0"/>
+                <a:ea typeface="Consolas" charset="0"/>
+                <a:cs typeface="Consolas" charset="0"/>
+              </a:rPr>
+              <a:t>yield</a:t>
+            </a:r>
+            <a:r>
+              <a:rPr lang="en-US" b="1" dirty="0">
+                <a:latin typeface="Consolas" charset="0"/>
+                <a:ea typeface="Consolas" charset="0"/>
+                <a:cs typeface="Consolas" charset="0"/>
+              </a:rPr>
+              <a:t> </a:t>
             </a:r>
             <a:r>
               <a:rPr lang="en-US" dirty="0">
@@ -8143,41 +7947,26 @@
                 <a:ea typeface="Consolas" charset="0"/>
                 <a:cs typeface="Consolas" charset="0"/>
               </a:rPr>
-              <a:t>(word) &lt;- child</a:t>
-            </a:r>
-            <a:br>
+              <a:t>(item \ </a:t>
+            </a:r>
+            <a:r>
               <a:rPr lang="en-US" dirty="0">
-                <a:latin typeface="Consolas" charset="0"/>
-                <a:ea typeface="Consolas" charset="0"/>
-                <a:cs typeface="Consolas" charset="0"/>
-              </a:rPr>
-            </a:br>
+                <a:solidFill>
+                  <a:srgbClr val="0225C8"/>
+                </a:solidFill>
+                <a:latin typeface="Consolas" charset="0"/>
+                <a:ea typeface="Consolas" charset="0"/>
+                <a:cs typeface="Consolas" charset="0"/>
+              </a:rPr>
+              <a:t>"Text"</a:t>
+            </a:r>
             <a:r>
               <a:rPr lang="en-US" dirty="0">
                 <a:latin typeface="Consolas" charset="0"/>
                 <a:ea typeface="Consolas" charset="0"/>
                 <a:cs typeface="Consolas" charset="0"/>
               </a:rPr>
-              <a:t>} </a:t>
-            </a:r>
-            <a:r>
-              <a:rPr lang="en-US" b="1" dirty="0">
-                <a:solidFill>
-                  <a:srgbClr val="7F0055"/>
-                </a:solidFill>
-                <a:latin typeface="Consolas" charset="0"/>
-                <a:ea typeface="Consolas" charset="0"/>
-                <a:cs typeface="Consolas" charset="0"/>
-              </a:rPr>
-              <a:t>yield </a:t>
-            </a:r>
-            <a:r>
-              <a:rPr lang="en-US" dirty="0">
-                <a:latin typeface="Consolas" charset="0"/>
-                <a:ea typeface="Consolas" charset="0"/>
-                <a:cs typeface="Consolas" charset="0"/>
-              </a:rPr>
-              <a:t>word</a:t>
+              <a:t>).text</a:t>
             </a:r>
             <a:endParaRPr lang="en-US" dirty="0" smtClean="0">
               <a:latin typeface="Consolas" charset="0"/>
@@ -8190,7 +7979,7 @@
     </p:spTree>
     <p:extLst>
       <p:ext uri="{BB962C8B-B14F-4D97-AF65-F5344CB8AC3E}">
-        <p14:creationId xmlns:p14="http://schemas.microsoft.com/office/powerpoint/2010/main" val="1266285778"/>
+        <p14:creationId xmlns:p14="http://schemas.microsoft.com/office/powerpoint/2010/main" val="1807395067"/>
       </p:ext>
     </p:extLst>
   </p:cSld>
@@ -8265,15 +8054,15 @@
                 <a:ea typeface="Consolas" charset="0"/>
                 <a:cs typeface="Consolas" charset="0"/>
               </a:rPr>
-              <a:t>WikipediaSuggestionComponent</a:t>
-            </a:r>
-            <a:r>
-              <a:rPr lang="en-US" dirty="0"/>
-              <a:t> </a:t>
-            </a:r>
-            <a:r>
-              <a:rPr lang="en-US" dirty="0" smtClean="0"/>
-              <a:t>with a </a:t>
+              <a:t>WikipediaParseJsonComponent</a:t>
+            </a:r>
+            <a:r>
+              <a:rPr lang="en-US" dirty="0" smtClean="0"/>
+              <a:t> with a </a:t>
+            </a:r>
+            <a:r>
+              <a:rPr lang="en-US" dirty="0" err="1" smtClean="0"/>
+              <a:t>Json</a:t>
             </a:r>
             <a:r>
               <a:rPr lang="en-US" dirty="0" err="1" smtClean="0">
@@ -8281,28 +8070,236 @@
                 <a:ea typeface="Consolas" charset="0"/>
                 <a:cs typeface="Consolas" charset="0"/>
               </a:rPr>
-              <a:t>WikipediaSuggestion</a:t>
-            </a:r>
-            <a:r>
-              <a:rPr lang="en-US" dirty="0" smtClean="0"/>
-              <a:t> trait in it, as well as its access point</a:t>
-            </a:r>
-          </a:p>
-          <a:p>
-            <a:r>
-              <a:rPr lang="en-US" dirty="0" smtClean="0"/>
-              <a:t>Declare dependencies on the component as self-type annotations:</a:t>
+              <a:t>ResponseParser</a:t>
+            </a:r>
+            <a:r>
+              <a:rPr lang="en-US" dirty="0" smtClean="0"/>
+              <a:t> and </a:t>
+            </a:r>
+            <a:r>
+              <a:rPr lang="en-US" b="1" dirty="0" smtClean="0"/>
+              <a:t>NO</a:t>
+            </a:r>
+            <a:r>
+              <a:rPr lang="en-US" dirty="0" smtClean="0"/>
+              <a:t> access point</a:t>
+            </a:r>
+          </a:p>
+          <a:p>
+            <a:r>
+              <a:rPr lang="en-US" dirty="0" smtClean="0"/>
+              <a:t>Let them extend the </a:t>
+            </a:r>
+            <a:r>
+              <a:rPr lang="en-US" dirty="0" err="1" smtClean="0">
+                <a:latin typeface="Consolas" charset="0"/>
+                <a:ea typeface="Consolas" charset="0"/>
+                <a:cs typeface="Consolas" charset="0"/>
+              </a:rPr>
+              <a:t>WikipediaParseComponent</a:t>
+            </a:r>
+            <a:r>
+              <a:rPr lang="en-US" dirty="0" smtClean="0"/>
+              <a:t> and </a:t>
+            </a:r>
+            <a:r>
+              <a:rPr lang="en-US" dirty="0" err="1" smtClean="0">
+                <a:latin typeface="Consolas" charset="0"/>
+                <a:ea typeface="Consolas" charset="0"/>
+                <a:cs typeface="Consolas" charset="0"/>
+              </a:rPr>
+              <a:t>ResponseParser</a:t>
+            </a:r>
+            <a:r>
+              <a:rPr lang="en-US" dirty="0" smtClean="0"/>
+              <a:t>.</a:t>
+            </a:r>
+          </a:p>
+          <a:p>
+            <a:r>
+              <a:rPr lang="en-US" dirty="0" smtClean="0"/>
+              <a:t>Implement the </a:t>
+            </a:r>
+            <a:r>
+              <a:rPr lang="en-US" dirty="0" smtClean="0">
+                <a:latin typeface="Consolas" charset="0"/>
+                <a:ea typeface="Consolas" charset="0"/>
+                <a:cs typeface="Consolas" charset="0"/>
+              </a:rPr>
+              <a:t>parse</a:t>
+            </a:r>
+            <a:r>
+              <a:rPr lang="en-US" dirty="0" smtClean="0"/>
+              <a:t> function:</a:t>
             </a:r>
           </a:p>
           <a:p>
             <a:pPr lvl="1"/>
             <a:r>
-              <a:rPr lang="en-US" dirty="0" err="1" smtClean="0">
-                <a:latin typeface="Consolas" charset="0"/>
-                <a:ea typeface="Consolas" charset="0"/>
-                <a:cs typeface="Consolas" charset="0"/>
-              </a:rPr>
-              <a:t>WikipediaFacadeComponent</a:t>
+              <a:rPr lang="en-US" b="1" dirty="0">
+                <a:solidFill>
+                  <a:srgbClr val="7F0055"/>
+                </a:solidFill>
+                <a:latin typeface="Consolas" charset="0"/>
+                <a:ea typeface="Consolas" charset="0"/>
+                <a:cs typeface="Consolas" charset="0"/>
+              </a:rPr>
+              <a:t>for </a:t>
+            </a:r>
+            <a:r>
+              <a:rPr lang="en-US" dirty="0">
+                <a:latin typeface="Consolas" charset="0"/>
+                <a:ea typeface="Consolas" charset="0"/>
+                <a:cs typeface="Consolas" charset="0"/>
+              </a:rPr>
+              <a:t>{</a:t>
+            </a:r>
+            <a:br>
+              <a:rPr lang="en-US" dirty="0">
+                <a:latin typeface="Consolas" charset="0"/>
+                <a:ea typeface="Consolas" charset="0"/>
+                <a:cs typeface="Consolas" charset="0"/>
+              </a:rPr>
+            </a:br>
+            <a:r>
+              <a:rPr lang="en-US" dirty="0">
+                <a:latin typeface="Consolas" charset="0"/>
+                <a:ea typeface="Consolas" charset="0"/>
+                <a:cs typeface="Consolas" charset="0"/>
+              </a:rPr>
+              <a:t>  </a:t>
+            </a:r>
+            <a:r>
+              <a:rPr lang="en-US" i="1" dirty="0" err="1">
+                <a:latin typeface="Consolas" charset="0"/>
+                <a:ea typeface="Consolas" charset="0"/>
+                <a:cs typeface="Consolas" charset="0"/>
+              </a:rPr>
+              <a:t>JArray</a:t>
+            </a:r>
+            <a:r>
+              <a:rPr lang="en-US" dirty="0">
+                <a:latin typeface="Consolas" charset="0"/>
+                <a:ea typeface="Consolas" charset="0"/>
+                <a:cs typeface="Consolas" charset="0"/>
+              </a:rPr>
+              <a:t>(child) &lt;- </a:t>
+            </a:r>
+            <a:r>
+              <a:rPr lang="en-US" dirty="0" err="1">
+                <a:latin typeface="Consolas" charset="0"/>
+                <a:ea typeface="Consolas" charset="0"/>
+                <a:cs typeface="Consolas" charset="0"/>
+              </a:rPr>
+              <a:t>JsonMethods.parse</a:t>
+            </a:r>
+            <a:r>
+              <a:rPr lang="en-US" dirty="0">
+                <a:latin typeface="Consolas" charset="0"/>
+                <a:ea typeface="Consolas" charset="0"/>
+                <a:cs typeface="Consolas" charset="0"/>
+              </a:rPr>
+              <a:t>(</a:t>
+            </a:r>
+            <a:r>
+              <a:rPr lang="en-US" dirty="0" err="1">
+                <a:latin typeface="Consolas" charset="0"/>
+                <a:ea typeface="Consolas" charset="0"/>
+                <a:cs typeface="Consolas" charset="0"/>
+              </a:rPr>
+              <a:t>json</a:t>
+            </a:r>
+            <a:r>
+              <a:rPr lang="en-US" dirty="0">
+                <a:latin typeface="Consolas" charset="0"/>
+                <a:ea typeface="Consolas" charset="0"/>
+                <a:cs typeface="Consolas" charset="0"/>
+              </a:rPr>
+              <a:t>)(</a:t>
+            </a:r>
+            <a:r>
+              <a:rPr lang="en-US" dirty="0">
+                <a:solidFill>
+                  <a:srgbClr val="C48CFF"/>
+                </a:solidFill>
+                <a:latin typeface="Consolas" charset="0"/>
+                <a:ea typeface="Consolas" charset="0"/>
+                <a:cs typeface="Consolas" charset="0"/>
+              </a:rPr>
+              <a:t>1</a:t>
+            </a:r>
+            <a:r>
+              <a:rPr lang="en-US" dirty="0">
+                <a:latin typeface="Consolas" charset="0"/>
+                <a:ea typeface="Consolas" charset="0"/>
+                <a:cs typeface="Consolas" charset="0"/>
+              </a:rPr>
+              <a:t>)</a:t>
+            </a:r>
+            <a:br>
+              <a:rPr lang="en-US" dirty="0">
+                <a:latin typeface="Consolas" charset="0"/>
+                <a:ea typeface="Consolas" charset="0"/>
+                <a:cs typeface="Consolas" charset="0"/>
+              </a:rPr>
+            </a:br>
+            <a:r>
+              <a:rPr lang="en-US" dirty="0">
+                <a:latin typeface="Consolas" charset="0"/>
+                <a:ea typeface="Consolas" charset="0"/>
+                <a:cs typeface="Consolas" charset="0"/>
+              </a:rPr>
+              <a:t>  </a:t>
+            </a:r>
+            <a:r>
+              <a:rPr lang="en-US" i="1" dirty="0" err="1">
+                <a:latin typeface="Consolas" charset="0"/>
+                <a:ea typeface="Consolas" charset="0"/>
+                <a:cs typeface="Consolas" charset="0"/>
+              </a:rPr>
+              <a:t>JString</a:t>
+            </a:r>
+            <a:r>
+              <a:rPr lang="en-US" dirty="0">
+                <a:latin typeface="Consolas" charset="0"/>
+                <a:ea typeface="Consolas" charset="0"/>
+                <a:cs typeface="Consolas" charset="0"/>
+              </a:rPr>
+              <a:t>(word) &lt;- child</a:t>
+            </a:r>
+            <a:br>
+              <a:rPr lang="en-US" dirty="0">
+                <a:latin typeface="Consolas" charset="0"/>
+                <a:ea typeface="Consolas" charset="0"/>
+                <a:cs typeface="Consolas" charset="0"/>
+              </a:rPr>
+            </a:br>
+            <a:r>
+              <a:rPr lang="en-US" dirty="0">
+                <a:latin typeface="Consolas" charset="0"/>
+                <a:ea typeface="Consolas" charset="0"/>
+                <a:cs typeface="Consolas" charset="0"/>
+              </a:rPr>
+              <a:t>} </a:t>
+            </a:r>
+            <a:r>
+              <a:rPr lang="en-US" b="1" dirty="0">
+                <a:solidFill>
+                  <a:srgbClr val="7F0055"/>
+                </a:solidFill>
+                <a:latin typeface="Consolas" charset="0"/>
+                <a:ea typeface="Consolas" charset="0"/>
+                <a:cs typeface="Consolas" charset="0"/>
+              </a:rPr>
+              <a:t>yield </a:t>
+            </a:r>
+            <a:r>
+              <a:rPr lang="en-US" dirty="0">
+                <a:latin typeface="Consolas" charset="0"/>
+                <a:ea typeface="Consolas" charset="0"/>
+                <a:cs typeface="Consolas" charset="0"/>
+              </a:rPr>
+              <a:t>word</a:t>
             </a:r>
             <a:endParaRPr lang="en-US" dirty="0" smtClean="0">
               <a:latin typeface="Consolas" charset="0"/>
@@ -8310,171 +8307,12 @@
               <a:cs typeface="Consolas" charset="0"/>
             </a:endParaRPr>
           </a:p>
-          <a:p>
-            <a:pPr lvl="1"/>
-            <a:r>
-              <a:rPr lang="en-US" dirty="0" err="1" smtClean="0">
-                <a:latin typeface="Consolas" charset="0"/>
-                <a:ea typeface="Consolas" charset="0"/>
-                <a:cs typeface="Consolas" charset="0"/>
-              </a:rPr>
-              <a:t>WikipediaParseComponent</a:t>
-            </a:r>
-            <a:endParaRPr lang="en-US" dirty="0" smtClean="0">
-              <a:latin typeface="Consolas" charset="0"/>
-              <a:ea typeface="Consolas" charset="0"/>
-              <a:cs typeface="Consolas" charset="0"/>
-            </a:endParaRPr>
-          </a:p>
-          <a:p>
-            <a:r>
-              <a:rPr lang="en-US" dirty="0" smtClean="0"/>
-              <a:t>In </a:t>
-            </a:r>
-            <a:r>
-              <a:rPr lang="en-US" dirty="0" err="1" smtClean="0">
-                <a:latin typeface="Consolas" charset="0"/>
-                <a:ea typeface="Consolas" charset="0"/>
-                <a:cs typeface="Consolas" charset="0"/>
-              </a:rPr>
-              <a:t>WikipediaSuggestion</a:t>
-            </a:r>
-            <a:r>
-              <a:rPr lang="en-US" dirty="0" smtClean="0"/>
-              <a:t> implement a </a:t>
-            </a:r>
-            <a:r>
-              <a:rPr lang="en-US" dirty="0"/>
-              <a:t>method </a:t>
-            </a:r>
-            <a:r>
-              <a:rPr lang="en-US" dirty="0" err="1">
-                <a:latin typeface="Consolas" charset="0"/>
-                <a:ea typeface="Consolas" charset="0"/>
-                <a:cs typeface="Consolas" charset="0"/>
-              </a:rPr>
-              <a:t>suggestArticles</a:t>
-            </a:r>
-            <a:r>
-              <a:rPr lang="en-US" dirty="0">
-                <a:latin typeface="Consolas" charset="0"/>
-                <a:ea typeface="Consolas" charset="0"/>
-                <a:cs typeface="Consolas" charset="0"/>
-              </a:rPr>
-              <a:t>(word: String): Observable[String</a:t>
-            </a:r>
-            <a:r>
-              <a:rPr lang="en-US" dirty="0" smtClean="0">
-                <a:latin typeface="Consolas" charset="0"/>
-                <a:ea typeface="Consolas" charset="0"/>
-                <a:cs typeface="Consolas" charset="0"/>
-              </a:rPr>
-              <a:t>]</a:t>
-            </a:r>
-          </a:p>
-          <a:p>
-            <a:pPr lvl="1"/>
-            <a:r>
-              <a:rPr lang="en-US" dirty="0" err="1">
-                <a:latin typeface="Consolas" charset="0"/>
-                <a:ea typeface="Consolas" charset="0"/>
-                <a:cs typeface="Consolas" charset="0"/>
-              </a:rPr>
-              <a:t>wikipediaFacade.search</a:t>
-            </a:r>
-            <a:r>
-              <a:rPr lang="en-US" dirty="0">
-                <a:latin typeface="Consolas" charset="0"/>
-                <a:ea typeface="Consolas" charset="0"/>
-                <a:cs typeface="Consolas" charset="0"/>
-              </a:rPr>
-              <a:t>(word)</a:t>
-            </a:r>
-            <a:br>
-              <a:rPr lang="en-US" dirty="0">
-                <a:latin typeface="Consolas" charset="0"/>
-                <a:ea typeface="Consolas" charset="0"/>
-                <a:cs typeface="Consolas" charset="0"/>
-              </a:rPr>
-            </a:br>
-            <a:r>
-              <a:rPr lang="en-US" dirty="0">
-                <a:latin typeface="Consolas" charset="0"/>
-                <a:ea typeface="Consolas" charset="0"/>
-                <a:cs typeface="Consolas" charset="0"/>
-              </a:rPr>
-              <a:t>  .map(</a:t>
-            </a:r>
-            <a:r>
-              <a:rPr lang="en-US" dirty="0" err="1">
-                <a:latin typeface="Consolas" charset="0"/>
-                <a:ea typeface="Consolas" charset="0"/>
-                <a:cs typeface="Consolas" charset="0"/>
-              </a:rPr>
-              <a:t>responseParser.parse</a:t>
-            </a:r>
-            <a:r>
-              <a:rPr lang="en-US" dirty="0">
-                <a:latin typeface="Consolas" charset="0"/>
-                <a:ea typeface="Consolas" charset="0"/>
-                <a:cs typeface="Consolas" charset="0"/>
-              </a:rPr>
-              <a:t>)</a:t>
-            </a:r>
-            <a:br>
-              <a:rPr lang="en-US" dirty="0">
-                <a:latin typeface="Consolas" charset="0"/>
-                <a:ea typeface="Consolas" charset="0"/>
-                <a:cs typeface="Consolas" charset="0"/>
-              </a:rPr>
-            </a:br>
-            <a:r>
-              <a:rPr lang="en-US" dirty="0">
-                <a:latin typeface="Consolas" charset="0"/>
-                <a:ea typeface="Consolas" charset="0"/>
-                <a:cs typeface="Consolas" charset="0"/>
-              </a:rPr>
-              <a:t>  .</a:t>
-            </a:r>
-            <a:r>
-              <a:rPr lang="en-US" dirty="0" err="1">
-                <a:latin typeface="Consolas" charset="0"/>
-                <a:ea typeface="Consolas" charset="0"/>
-                <a:cs typeface="Consolas" charset="0"/>
-              </a:rPr>
-              <a:t>flatMapIterable</a:t>
-            </a:r>
-            <a:r>
-              <a:rPr lang="en-US" dirty="0">
-                <a:latin typeface="Consolas" charset="0"/>
-                <a:ea typeface="Consolas" charset="0"/>
-                <a:cs typeface="Consolas" charset="0"/>
-              </a:rPr>
-              <a:t>(</a:t>
-            </a:r>
-            <a:r>
-              <a:rPr lang="en-US" i="1" dirty="0">
-                <a:latin typeface="Consolas" charset="0"/>
-                <a:ea typeface="Consolas" charset="0"/>
-                <a:cs typeface="Consolas" charset="0"/>
-              </a:rPr>
-              <a:t>identity</a:t>
-            </a:r>
-            <a:r>
-              <a:rPr lang="en-US" dirty="0">
-                <a:latin typeface="Consolas" charset="0"/>
-                <a:ea typeface="Consolas" charset="0"/>
-                <a:cs typeface="Consolas" charset="0"/>
-              </a:rPr>
-              <a:t>)</a:t>
-            </a:r>
-          </a:p>
         </p:txBody>
       </p:sp>
     </p:spTree>
     <p:extLst>
       <p:ext uri="{BB962C8B-B14F-4D97-AF65-F5344CB8AC3E}">
-        <p14:creationId xmlns:p14="http://schemas.microsoft.com/office/powerpoint/2010/main" val="335756892"/>
+        <p14:creationId xmlns:p14="http://schemas.microsoft.com/office/powerpoint/2010/main" val="1266285778"/>
       </p:ext>
     </p:extLst>
   </p:cSld>
@@ -8534,41 +8372,59 @@
             <p:ph idx="1"/>
           </p:nvPr>
         </p:nvSpPr>
-        <p:spPr>
-          <a:xfrm>
-            <a:off x="838200" y="1825624"/>
-            <a:ext cx="10515600" cy="5032375"/>
-          </a:xfrm>
-        </p:spPr>
+        <p:spPr/>
         <p:txBody>
           <a:bodyPr/>
           <a:lstStyle/>
           <a:p>
             <a:r>
               <a:rPr lang="en-US" dirty="0" smtClean="0"/>
-              <a:t>Create an object Main that extends</a:t>
+              <a:t>Create a </a:t>
+            </a:r>
+            <a:r>
+              <a:rPr lang="en-US" dirty="0" err="1" smtClean="0">
+                <a:latin typeface="Consolas" charset="0"/>
+                <a:ea typeface="Consolas" charset="0"/>
+                <a:cs typeface="Consolas" charset="0"/>
+              </a:rPr>
+              <a:t>WikipediaSuggestionComponent</a:t>
+            </a:r>
+            <a:r>
+              <a:rPr lang="en-US" dirty="0"/>
+              <a:t> </a:t>
+            </a:r>
+            <a:r>
+              <a:rPr lang="en-US" dirty="0" smtClean="0"/>
+              <a:t>with a </a:t>
+            </a:r>
+            <a:r>
+              <a:rPr lang="en-US" dirty="0" err="1" smtClean="0">
+                <a:latin typeface="Consolas" charset="0"/>
+                <a:ea typeface="Consolas" charset="0"/>
+                <a:cs typeface="Consolas" charset="0"/>
+              </a:rPr>
+              <a:t>WikipediaSuggestion</a:t>
+            </a:r>
+            <a:r>
+              <a:rPr lang="en-US" dirty="0" smtClean="0"/>
+              <a:t> trait in it, as well as its access point</a:t>
+            </a:r>
+          </a:p>
+          <a:p>
+            <a:r>
+              <a:rPr lang="en-US" dirty="0" smtClean="0"/>
+              <a:t>Declare dependencies on the component as self-type annotations:</a:t>
             </a:r>
           </a:p>
           <a:p>
             <a:pPr lvl="1"/>
             <a:r>
-              <a:rPr lang="en-US" dirty="0" smtClean="0">
-                <a:latin typeface="Consolas" charset="0"/>
-                <a:ea typeface="Consolas" charset="0"/>
-                <a:cs typeface="Consolas" charset="0"/>
-              </a:rPr>
-              <a:t>App</a:t>
-            </a:r>
-          </a:p>
-          <a:p>
-            <a:pPr lvl="1"/>
-            <a:r>
               <a:rPr lang="en-US" dirty="0" err="1" smtClean="0">
                 <a:latin typeface="Consolas" charset="0"/>
                 <a:ea typeface="Consolas" charset="0"/>
                 <a:cs typeface="Consolas" charset="0"/>
               </a:rPr>
-              <a:t>WikipediaSuggestionComponent</a:t>
+              <a:t>WikipediaFacadeComponent</a:t>
             </a:r>
             <a:endParaRPr lang="en-US" dirty="0" smtClean="0">
               <a:latin typeface="Consolas" charset="0"/>
@@ -8584,7 +8440,7 @@
                 <a:ea typeface="Consolas" charset="0"/>
                 <a:cs typeface="Consolas" charset="0"/>
               </a:rPr>
-              <a:t>WikipediaFacadeComponent</a:t>
+              <a:t>WikipediaParseComponent</a:t>
             </a:r>
             <a:endParaRPr lang="en-US" dirty="0" smtClean="0">
               <a:latin typeface="Consolas" charset="0"/>
@@ -8593,166 +8449,60 @@
             </a:endParaRPr>
           </a:p>
           <a:p>
+            <a:r>
+              <a:rPr lang="en-US" dirty="0" smtClean="0"/>
+              <a:t>In </a:t>
+            </a:r>
+            <a:r>
+              <a:rPr lang="en-US" dirty="0" err="1" smtClean="0">
+                <a:latin typeface="Consolas" charset="0"/>
+                <a:ea typeface="Consolas" charset="0"/>
+                <a:cs typeface="Consolas" charset="0"/>
+              </a:rPr>
+              <a:t>WikipediaSuggestion</a:t>
+            </a:r>
+            <a:r>
+              <a:rPr lang="en-US" dirty="0" smtClean="0"/>
+              <a:t> implement a </a:t>
+            </a:r>
+            <a:r>
+              <a:rPr lang="en-US" dirty="0"/>
+              <a:t>method </a:t>
+            </a:r>
+            <a:r>
+              <a:rPr lang="en-US" dirty="0" err="1">
+                <a:latin typeface="Consolas" charset="0"/>
+                <a:ea typeface="Consolas" charset="0"/>
+                <a:cs typeface="Consolas" charset="0"/>
+              </a:rPr>
+              <a:t>suggestArticles</a:t>
+            </a:r>
+            <a:r>
+              <a:rPr lang="en-US" dirty="0">
+                <a:latin typeface="Consolas" charset="0"/>
+                <a:ea typeface="Consolas" charset="0"/>
+                <a:cs typeface="Consolas" charset="0"/>
+              </a:rPr>
+              <a:t>(word: String): Observable[String</a:t>
+            </a:r>
+            <a:r>
+              <a:rPr lang="en-US" dirty="0" smtClean="0">
+                <a:latin typeface="Consolas" charset="0"/>
+                <a:ea typeface="Consolas" charset="0"/>
+                <a:cs typeface="Consolas" charset="0"/>
+              </a:rPr>
+              <a:t>]</a:t>
+            </a:r>
+          </a:p>
+          <a:p>
             <a:pPr lvl="1"/>
             <a:r>
-              <a:rPr lang="en-US" dirty="0" smtClean="0"/>
-              <a:t>Any implementation of the </a:t>
-            </a:r>
-            <a:r>
-              <a:rPr lang="en-US" dirty="0" err="1" smtClean="0">
-                <a:latin typeface="Consolas" charset="0"/>
-                <a:ea typeface="Consolas" charset="0"/>
-                <a:cs typeface="Consolas" charset="0"/>
-              </a:rPr>
-              <a:t>WikipediaParseComponent</a:t>
-            </a:r>
-            <a:endParaRPr lang="en-US" dirty="0" smtClean="0">
-              <a:latin typeface="Consolas" charset="0"/>
-              <a:ea typeface="Consolas" charset="0"/>
-              <a:cs typeface="Consolas" charset="0"/>
-            </a:endParaRPr>
-          </a:p>
-          <a:p>
-            <a:r>
-              <a:rPr lang="en-US" dirty="0" smtClean="0">
-                <a:ea typeface="Consolas" charset="0"/>
-                <a:cs typeface="Consolas" charset="0"/>
-              </a:rPr>
-              <a:t>Assign values to the three access points</a:t>
-            </a:r>
-          </a:p>
-          <a:p>
-            <a:pPr lvl="1"/>
-            <a:r>
-              <a:rPr lang="en-US" dirty="0" smtClean="0">
-                <a:ea typeface="Consolas" charset="0"/>
-                <a:cs typeface="Consolas" charset="0"/>
-              </a:rPr>
-              <a:t>For the </a:t>
-            </a:r>
-            <a:r>
-              <a:rPr lang="en-US" dirty="0" err="1" smtClean="0">
-                <a:ea typeface="Consolas" charset="0"/>
-                <a:cs typeface="Consolas" charset="0"/>
-              </a:rPr>
-              <a:t>baseUrl</a:t>
-            </a:r>
-            <a:r>
-              <a:rPr lang="en-US" dirty="0" smtClean="0">
-                <a:ea typeface="Consolas" charset="0"/>
-                <a:cs typeface="Consolas" charset="0"/>
-              </a:rPr>
-              <a:t> use either (depending on the implementation choice above):</a:t>
-            </a:r>
-          </a:p>
-          <a:p>
-            <a:pPr lvl="2"/>
-            <a:r>
-              <a:rPr lang="en-US" dirty="0" smtClean="0"/>
-              <a:t>https</a:t>
-            </a:r>
-            <a:r>
-              <a:rPr lang="en-US" dirty="0"/>
-              <a:t>://</a:t>
-            </a:r>
-            <a:r>
-              <a:rPr lang="en-US" dirty="0" err="1"/>
-              <a:t>en.wikipedia.org</a:t>
-            </a:r>
-            <a:r>
-              <a:rPr lang="en-US" dirty="0"/>
-              <a:t>/w/</a:t>
-            </a:r>
-            <a:r>
-              <a:rPr lang="en-US" dirty="0" err="1"/>
-              <a:t>api.php?action</a:t>
-            </a:r>
-            <a:r>
-              <a:rPr lang="en-US" dirty="0"/>
-              <a:t>=</a:t>
-            </a:r>
-            <a:r>
-              <a:rPr lang="en-US" dirty="0" err="1"/>
-              <a:t>opensearch&amp;format</a:t>
-            </a:r>
-            <a:r>
-              <a:rPr lang="en-US" dirty="0"/>
-              <a:t>=</a:t>
-            </a:r>
-            <a:r>
-              <a:rPr lang="en-US" dirty="0" err="1"/>
-              <a:t>xml&amp;search</a:t>
-            </a:r>
-            <a:r>
-              <a:rPr lang="en-US" dirty="0" smtClean="0"/>
-              <a:t>=</a:t>
-            </a:r>
-          </a:p>
-          <a:p>
-            <a:pPr lvl="2"/>
-            <a:r>
-              <a:rPr lang="en-US" dirty="0"/>
-              <a:t>https://</a:t>
-            </a:r>
-            <a:r>
-              <a:rPr lang="en-US" dirty="0" err="1" smtClean="0"/>
-              <a:t>en.wikipedia.org</a:t>
-            </a:r>
-            <a:r>
-              <a:rPr lang="en-US" dirty="0" smtClean="0"/>
-              <a:t>/w/</a:t>
-            </a:r>
-            <a:r>
-              <a:rPr lang="en-US" dirty="0" err="1" smtClean="0"/>
-              <a:t>api.php?action</a:t>
-            </a:r>
-            <a:r>
-              <a:rPr lang="en-US" dirty="0" smtClean="0"/>
-              <a:t>=</a:t>
-            </a:r>
-            <a:r>
-              <a:rPr lang="en-US" dirty="0" err="1" smtClean="0"/>
-              <a:t>opensearch&amp;format</a:t>
-            </a:r>
-            <a:r>
-              <a:rPr lang="en-US" dirty="0" smtClean="0"/>
-              <a:t>=</a:t>
-            </a:r>
-            <a:r>
-              <a:rPr lang="en-US" dirty="0" err="1" smtClean="0"/>
-              <a:t>json&amp;search</a:t>
-            </a:r>
-            <a:r>
-              <a:rPr lang="en-US" dirty="0" smtClean="0"/>
-              <a:t>=</a:t>
-            </a:r>
-          </a:p>
-          <a:p>
-            <a:r>
-              <a:rPr lang="en-US" dirty="0" smtClean="0"/>
-              <a:t>Call and run </a:t>
-            </a:r>
-          </a:p>
-          <a:p>
-            <a:pPr lvl="1"/>
-            <a:r>
               <a:rPr lang="en-US" dirty="0" err="1">
-                <a:solidFill>
-                  <a:srgbClr val="6A68FF"/>
-                </a:solidFill>
-                <a:latin typeface="Consolas" charset="0"/>
-                <a:ea typeface="Consolas" charset="0"/>
-                <a:cs typeface="Consolas" charset="0"/>
-              </a:rPr>
-              <a:t>wikipediaSuggest</a:t>
-            </a:r>
-            <a:r>
-              <a:rPr lang="en-US" dirty="0" err="1">
-                <a:latin typeface="Consolas" charset="0"/>
-                <a:ea typeface="Consolas" charset="0"/>
-                <a:cs typeface="Consolas" charset="0"/>
-              </a:rPr>
-              <a:t>.suggestArticles</a:t>
+                <a:latin typeface="Consolas" charset="0"/>
+                <a:ea typeface="Consolas" charset="0"/>
+                <a:cs typeface="Consolas" charset="0"/>
+              </a:rPr>
+              <a:t>wikipediaFacade.search</a:t>
             </a:r>
             <a:r>
               <a:rPr lang="en-US" dirty="0">
@@ -8760,26 +8510,7 @@
                 <a:ea typeface="Consolas" charset="0"/>
                 <a:cs typeface="Consolas" charset="0"/>
               </a:rPr>
-              <a:t>(</a:t>
-            </a:r>
-            <a:r>
-              <a:rPr lang="en-US" dirty="0">
-                <a:solidFill>
-                  <a:srgbClr val="0225C8"/>
-                </a:solidFill>
-                <a:latin typeface="Consolas" charset="0"/>
-                <a:ea typeface="Consolas" charset="0"/>
-                <a:cs typeface="Consolas" charset="0"/>
-              </a:rPr>
-              <a:t>"Hello World"</a:t>
-            </a:r>
-            <a:r>
-              <a:rPr lang="en-US" dirty="0">
-                <a:latin typeface="Consolas" charset="0"/>
-                <a:ea typeface="Consolas" charset="0"/>
-                <a:cs typeface="Consolas" charset="0"/>
-              </a:rPr>
-              <a:t>)</a:t>
+              <a:t>(word)</a:t>
             </a:r>
             <a:br>
               <a:rPr lang="en-US" dirty="0">
@@ -8794,15 +8525,15 @@
                 <a:ea typeface="Consolas" charset="0"/>
                 <a:cs typeface="Consolas" charset="0"/>
               </a:rPr>
-              <a:t>  .subscribe(</a:t>
-            </a:r>
-            <a:r>
-              <a:rPr lang="en-US" i="1" dirty="0" err="1">
-                <a:latin typeface="Consolas" charset="0"/>
-                <a:ea typeface="Consolas" charset="0"/>
-                <a:cs typeface="Consolas" charset="0"/>
-              </a:rPr>
-              <a:t>println</a:t>
+              <a:t>  .map(</a:t>
+            </a:r>
+            <a:r>
+              <a:rPr lang="en-US" dirty="0" err="1">
+                <a:latin typeface="Consolas" charset="0"/>
+                <a:ea typeface="Consolas" charset="0"/>
+                <a:cs typeface="Consolas" charset="0"/>
+              </a:rPr>
+              <a:t>responseParser.parse</a:t>
             </a:r>
             <a:r>
               <a:rPr lang="en-US" dirty="0">
@@ -8810,7 +8541,22 @@
                 <a:ea typeface="Consolas" charset="0"/>
                 <a:cs typeface="Consolas" charset="0"/>
               </a:rPr>
-              <a:t>, _.</a:t>
+              <a:t>)</a:t>
+            </a:r>
+            <a:br>
+              <a:rPr lang="en-US" dirty="0">
+                <a:latin typeface="Consolas" charset="0"/>
+                <a:ea typeface="Consolas" charset="0"/>
+                <a:cs typeface="Consolas" charset="0"/>
+              </a:rPr>
+            </a:br>
+            <a:r>
+              <a:rPr lang="en-US" dirty="0">
+                <a:latin typeface="Consolas" charset="0"/>
+                <a:ea typeface="Consolas" charset="0"/>
+                <a:cs typeface="Consolas" charset="0"/>
+              </a:rPr>
+              <a:t>  .</a:t>
             </a:r>
             <a:r>
               <a:rPr lang="en-US" dirty="0" err="1">
@@ -8818,7 +8564,7 @@
                 <a:ea typeface="Consolas" charset="0"/>
                 <a:cs typeface="Consolas" charset="0"/>
               </a:rPr>
-              <a:t>printStackTrace</a:t>
+              <a:t>flatMapIterable</a:t>
             </a:r>
             <a:r>
               <a:rPr lang="en-US" dirty="0">
@@ -8826,7 +8572,23 @@
                 <a:ea typeface="Consolas" charset="0"/>
                 <a:cs typeface="Consolas" charset="0"/>
               </a:rPr>
-              <a:t>())</a:t>
+              <a:t>(</a:t>
+            </a:r>
+            <a:r>
+              <a:rPr lang="en-US" i="1" dirty="0">
+                <a:latin typeface="Consolas" charset="0"/>
+                <a:ea typeface="Consolas" charset="0"/>
+                <a:cs typeface="Consolas" charset="0"/>
+              </a:rPr>
+              <a:t>identity</a:t>
+            </a:r>
+            <a:r>
+              <a:rPr lang="en-US" dirty="0">
+                <a:latin typeface="Consolas" charset="0"/>
+                <a:ea typeface="Consolas" charset="0"/>
+                <a:cs typeface="Consolas" charset="0"/>
+              </a:rPr>
+              <a:t>)</a:t>
             </a:r>
           </a:p>
         </p:txBody>
@@ -8834,7 +8596,7 @@
     </p:spTree>
     <p:extLst>
       <p:ext uri="{BB962C8B-B14F-4D97-AF65-F5344CB8AC3E}">
-        <p14:creationId xmlns:p14="http://schemas.microsoft.com/office/powerpoint/2010/main" val="1310496860"/>
+        <p14:creationId xmlns:p14="http://schemas.microsoft.com/office/powerpoint/2010/main" val="335756892"/>
       </p:ext>
     </p:extLst>
   </p:cSld>
@@ -8901,6 +8663,366 @@
           </a:xfrm>
         </p:spPr>
         <p:txBody>
+          <a:bodyPr/>
+          <a:lstStyle/>
+          <a:p>
+            <a:r>
+              <a:rPr lang="en-US" dirty="0" smtClean="0"/>
+              <a:t>Create an object Main that extends</a:t>
+            </a:r>
+          </a:p>
+          <a:p>
+            <a:pPr lvl="1"/>
+            <a:r>
+              <a:rPr lang="en-US" dirty="0" smtClean="0">
+                <a:latin typeface="Consolas" charset="0"/>
+                <a:ea typeface="Consolas" charset="0"/>
+                <a:cs typeface="Consolas" charset="0"/>
+              </a:rPr>
+              <a:t>App</a:t>
+            </a:r>
+          </a:p>
+          <a:p>
+            <a:pPr lvl="1"/>
+            <a:r>
+              <a:rPr lang="en-US" dirty="0" err="1" smtClean="0">
+                <a:latin typeface="Consolas" charset="0"/>
+                <a:ea typeface="Consolas" charset="0"/>
+                <a:cs typeface="Consolas" charset="0"/>
+              </a:rPr>
+              <a:t>WikipediaSuggestionComponent</a:t>
+            </a:r>
+            <a:endParaRPr lang="en-US" dirty="0" smtClean="0">
+              <a:latin typeface="Consolas" charset="0"/>
+              <a:ea typeface="Consolas" charset="0"/>
+              <a:cs typeface="Consolas" charset="0"/>
+            </a:endParaRPr>
+          </a:p>
+          <a:p>
+            <a:pPr lvl="1"/>
+            <a:r>
+              <a:rPr lang="en-US" dirty="0" err="1" smtClean="0">
+                <a:latin typeface="Consolas" charset="0"/>
+                <a:ea typeface="Consolas" charset="0"/>
+                <a:cs typeface="Consolas" charset="0"/>
+              </a:rPr>
+              <a:t>WikipediaFacadeComponent</a:t>
+            </a:r>
+            <a:endParaRPr lang="en-US" dirty="0" smtClean="0">
+              <a:latin typeface="Consolas" charset="0"/>
+              <a:ea typeface="Consolas" charset="0"/>
+              <a:cs typeface="Consolas" charset="0"/>
+            </a:endParaRPr>
+          </a:p>
+          <a:p>
+            <a:pPr lvl="1"/>
+            <a:r>
+              <a:rPr lang="en-US" dirty="0" smtClean="0"/>
+              <a:t>Any implementation of the </a:t>
+            </a:r>
+            <a:r>
+              <a:rPr lang="en-US" dirty="0" err="1" smtClean="0">
+                <a:latin typeface="Consolas" charset="0"/>
+                <a:ea typeface="Consolas" charset="0"/>
+                <a:cs typeface="Consolas" charset="0"/>
+              </a:rPr>
+              <a:t>WikipediaParseComponent</a:t>
+            </a:r>
+            <a:endParaRPr lang="en-US" dirty="0" smtClean="0">
+              <a:latin typeface="Consolas" charset="0"/>
+              <a:ea typeface="Consolas" charset="0"/>
+              <a:cs typeface="Consolas" charset="0"/>
+            </a:endParaRPr>
+          </a:p>
+          <a:p>
+            <a:r>
+              <a:rPr lang="en-US" dirty="0" smtClean="0">
+                <a:ea typeface="Consolas" charset="0"/>
+                <a:cs typeface="Consolas" charset="0"/>
+              </a:rPr>
+              <a:t>Assign values to the three access points</a:t>
+            </a:r>
+          </a:p>
+          <a:p>
+            <a:pPr lvl="1"/>
+            <a:r>
+              <a:rPr lang="en-US" dirty="0" smtClean="0">
+                <a:ea typeface="Consolas" charset="0"/>
+                <a:cs typeface="Consolas" charset="0"/>
+              </a:rPr>
+              <a:t>For the </a:t>
+            </a:r>
+            <a:r>
+              <a:rPr lang="en-US" dirty="0" err="1" smtClean="0">
+                <a:ea typeface="Consolas" charset="0"/>
+                <a:cs typeface="Consolas" charset="0"/>
+              </a:rPr>
+              <a:t>baseUrl</a:t>
+            </a:r>
+            <a:r>
+              <a:rPr lang="en-US" dirty="0" smtClean="0">
+                <a:ea typeface="Consolas" charset="0"/>
+                <a:cs typeface="Consolas" charset="0"/>
+              </a:rPr>
+              <a:t> use either (depending on the implementation choice above):</a:t>
+            </a:r>
+          </a:p>
+          <a:p>
+            <a:pPr lvl="2"/>
+            <a:r>
+              <a:rPr lang="en-US" dirty="0" smtClean="0"/>
+              <a:t>https</a:t>
+            </a:r>
+            <a:r>
+              <a:rPr lang="en-US" dirty="0"/>
+              <a:t>://</a:t>
+            </a:r>
+            <a:r>
+              <a:rPr lang="en-US" dirty="0" err="1"/>
+              <a:t>en.wikipedia.org</a:t>
+            </a:r>
+            <a:r>
+              <a:rPr lang="en-US" dirty="0"/>
+              <a:t>/w/</a:t>
+            </a:r>
+            <a:r>
+              <a:rPr lang="en-US" dirty="0" err="1"/>
+              <a:t>api.php?action</a:t>
+            </a:r>
+            <a:r>
+              <a:rPr lang="en-US" dirty="0"/>
+              <a:t>=</a:t>
+            </a:r>
+            <a:r>
+              <a:rPr lang="en-US" dirty="0" err="1"/>
+              <a:t>opensearch&amp;format</a:t>
+            </a:r>
+            <a:r>
+              <a:rPr lang="en-US" dirty="0"/>
+              <a:t>=</a:t>
+            </a:r>
+            <a:r>
+              <a:rPr lang="en-US" dirty="0" err="1"/>
+              <a:t>xml&amp;search</a:t>
+            </a:r>
+            <a:r>
+              <a:rPr lang="en-US" dirty="0" smtClean="0"/>
+              <a:t>=</a:t>
+            </a:r>
+          </a:p>
+          <a:p>
+            <a:pPr lvl="2"/>
+            <a:r>
+              <a:rPr lang="en-US" dirty="0"/>
+              <a:t>https://</a:t>
+            </a:r>
+            <a:r>
+              <a:rPr lang="en-US" dirty="0" err="1" smtClean="0"/>
+              <a:t>en.wikipedia.org</a:t>
+            </a:r>
+            <a:r>
+              <a:rPr lang="en-US" dirty="0" smtClean="0"/>
+              <a:t>/w/</a:t>
+            </a:r>
+            <a:r>
+              <a:rPr lang="en-US" dirty="0" err="1" smtClean="0"/>
+              <a:t>api.php?action</a:t>
+            </a:r>
+            <a:r>
+              <a:rPr lang="en-US" dirty="0" smtClean="0"/>
+              <a:t>=</a:t>
+            </a:r>
+            <a:r>
+              <a:rPr lang="en-US" dirty="0" err="1" smtClean="0"/>
+              <a:t>opensearch&amp;format</a:t>
+            </a:r>
+            <a:r>
+              <a:rPr lang="en-US" dirty="0" smtClean="0"/>
+              <a:t>=</a:t>
+            </a:r>
+            <a:r>
+              <a:rPr lang="en-US" dirty="0" err="1" smtClean="0"/>
+              <a:t>json&amp;search</a:t>
+            </a:r>
+            <a:r>
+              <a:rPr lang="en-US" dirty="0" smtClean="0"/>
+              <a:t>=</a:t>
+            </a:r>
+          </a:p>
+          <a:p>
+            <a:r>
+              <a:rPr lang="en-US" dirty="0" smtClean="0"/>
+              <a:t>Call and run </a:t>
+            </a:r>
+          </a:p>
+          <a:p>
+            <a:pPr lvl="1"/>
+            <a:r>
+              <a:rPr lang="en-US" dirty="0" err="1">
+                <a:solidFill>
+                  <a:srgbClr val="6A68FF"/>
+                </a:solidFill>
+                <a:latin typeface="Consolas" charset="0"/>
+                <a:ea typeface="Consolas" charset="0"/>
+                <a:cs typeface="Consolas" charset="0"/>
+              </a:rPr>
+              <a:t>wikipediaSuggest</a:t>
+            </a:r>
+            <a:r>
+              <a:rPr lang="en-US" dirty="0" err="1">
+                <a:latin typeface="Consolas" charset="0"/>
+                <a:ea typeface="Consolas" charset="0"/>
+                <a:cs typeface="Consolas" charset="0"/>
+              </a:rPr>
+              <a:t>.suggestArticles</a:t>
+            </a:r>
+            <a:r>
+              <a:rPr lang="en-US" dirty="0">
+                <a:latin typeface="Consolas" charset="0"/>
+                <a:ea typeface="Consolas" charset="0"/>
+                <a:cs typeface="Consolas" charset="0"/>
+              </a:rPr>
+              <a:t>(</a:t>
+            </a:r>
+            <a:r>
+              <a:rPr lang="en-US" dirty="0">
+                <a:solidFill>
+                  <a:srgbClr val="0225C8"/>
+                </a:solidFill>
+                <a:latin typeface="Consolas" charset="0"/>
+                <a:ea typeface="Consolas" charset="0"/>
+                <a:cs typeface="Consolas" charset="0"/>
+              </a:rPr>
+              <a:t>"Hello World"</a:t>
+            </a:r>
+            <a:r>
+              <a:rPr lang="en-US" dirty="0">
+                <a:latin typeface="Consolas" charset="0"/>
+                <a:ea typeface="Consolas" charset="0"/>
+                <a:cs typeface="Consolas" charset="0"/>
+              </a:rPr>
+              <a:t>)</a:t>
+            </a:r>
+            <a:br>
+              <a:rPr lang="en-US" dirty="0">
+                <a:latin typeface="Consolas" charset="0"/>
+                <a:ea typeface="Consolas" charset="0"/>
+                <a:cs typeface="Consolas" charset="0"/>
+              </a:rPr>
+            </a:br>
+            <a:r>
+              <a:rPr lang="en-US" dirty="0">
+                <a:latin typeface="Consolas" charset="0"/>
+                <a:ea typeface="Consolas" charset="0"/>
+                <a:cs typeface="Consolas" charset="0"/>
+              </a:rPr>
+              <a:t>  .subscribe(</a:t>
+            </a:r>
+            <a:r>
+              <a:rPr lang="en-US" i="1" dirty="0" err="1">
+                <a:latin typeface="Consolas" charset="0"/>
+                <a:ea typeface="Consolas" charset="0"/>
+                <a:cs typeface="Consolas" charset="0"/>
+              </a:rPr>
+              <a:t>println</a:t>
+            </a:r>
+            <a:r>
+              <a:rPr lang="en-US" dirty="0">
+                <a:latin typeface="Consolas" charset="0"/>
+                <a:ea typeface="Consolas" charset="0"/>
+                <a:cs typeface="Consolas" charset="0"/>
+              </a:rPr>
+              <a:t>, _.</a:t>
+            </a:r>
+            <a:r>
+              <a:rPr lang="en-US" dirty="0" err="1">
+                <a:latin typeface="Consolas" charset="0"/>
+                <a:ea typeface="Consolas" charset="0"/>
+                <a:cs typeface="Consolas" charset="0"/>
+              </a:rPr>
+              <a:t>printStackTrace</a:t>
+            </a:r>
+            <a:r>
+              <a:rPr lang="en-US" dirty="0">
+                <a:latin typeface="Consolas" charset="0"/>
+                <a:ea typeface="Consolas" charset="0"/>
+                <a:cs typeface="Consolas" charset="0"/>
+              </a:rPr>
+              <a:t>())</a:t>
+            </a:r>
+          </a:p>
+        </p:txBody>
+      </p:sp>
+    </p:spTree>
+    <p:extLst>
+      <p:ext uri="{BB962C8B-B14F-4D97-AF65-F5344CB8AC3E}">
+        <p14:creationId xmlns:p14="http://schemas.microsoft.com/office/powerpoint/2010/main" val="1310496860"/>
+      </p:ext>
+    </p:extLst>
+  </p:cSld>
+  <p:clrMapOvr>
+    <a:masterClrMapping/>
+  </p:clrMapOvr>
+</p:sld>
+</file>
+
+<file path=ppt/slides/slide24.xml><?xml version="1.0" encoding="utf-8"?>
+<p:sld xmlns:a="http://schemas.openxmlformats.org/drawingml/2006/main" xmlns:r="http://schemas.openxmlformats.org/officeDocument/2006/relationships" xmlns:p="http://schemas.openxmlformats.org/presentationml/2006/main">
+  <p:cSld>
+    <p:spTree>
+      <p:nvGrpSpPr>
+        <p:cNvPr id="1" name=""/>
+        <p:cNvGrpSpPr/>
+        <p:nvPr/>
+      </p:nvGrpSpPr>
+      <p:grpSpPr>
+        <a:xfrm>
+          <a:off x="0" y="0"/>
+          <a:ext cx="0" cy="0"/>
+          <a:chOff x="0" y="0"/>
+          <a:chExt cx="0" cy="0"/>
+        </a:xfrm>
+      </p:grpSpPr>
+      <p:sp>
+        <p:nvSpPr>
+          <p:cNvPr id="2" name="Title 1"/>
+          <p:cNvSpPr>
+            <a:spLocks noGrp="1"/>
+          </p:cNvSpPr>
+          <p:nvPr>
+            <p:ph type="title"/>
+          </p:nvPr>
+        </p:nvSpPr>
+        <p:spPr/>
+        <p:txBody>
+          <a:bodyPr/>
+          <a:lstStyle/>
+          <a:p>
+            <a:r>
+              <a:rPr lang="en-US" dirty="0" smtClean="0"/>
+              <a:t>Assignment</a:t>
+            </a:r>
+            <a:endParaRPr lang="en-US" dirty="0"/>
+          </a:p>
+        </p:txBody>
+      </p:sp>
+      <p:sp>
+        <p:nvSpPr>
+          <p:cNvPr id="3" name="Content Placeholder 2"/>
+          <p:cNvSpPr>
+            <a:spLocks noGrp="1"/>
+          </p:cNvSpPr>
+          <p:nvPr>
+            <p:ph idx="1"/>
+          </p:nvPr>
+        </p:nvSpPr>
+        <p:spPr>
+          <a:xfrm>
+            <a:off x="838200" y="1825624"/>
+            <a:ext cx="10515600" cy="5032375"/>
+          </a:xfrm>
+        </p:spPr>
+        <p:txBody>
           <a:bodyPr>
             <a:noAutofit/>
           </a:bodyPr>
@@ -8963,15 +9085,29 @@
                 <a:ea typeface="Consolas" charset="0"/>
                 <a:cs typeface="Consolas" charset="0"/>
               </a:rPr>
-              <a:t> </a:t>
+              <a:t> should </a:t>
             </a:r>
             <a:r>
               <a:rPr lang="en-US" sz="2000" dirty="0">
-                <a:latin typeface="Consolas" charset="0"/>
-                <a:ea typeface="Consolas" charset="0"/>
-                <a:cs typeface="Consolas" charset="0"/>
-              </a:rPr>
-              <a:t>should </a:t>
+                <a:solidFill>
+                  <a:srgbClr val="0225C8"/>
+                </a:solidFill>
+                <a:latin typeface="Consolas" charset="0"/>
+                <a:ea typeface="Consolas" charset="0"/>
+                <a:cs typeface="Consolas" charset="0"/>
+              </a:rPr>
+              <a:t>"call the </a:t>
+            </a:r>
+            <a:r>
+              <a:rPr lang="en-US" sz="2000" dirty="0" err="1">
+                <a:solidFill>
+                  <a:srgbClr val="0225C8"/>
+                </a:solidFill>
+                <a:latin typeface="Consolas" charset="0"/>
+                <a:ea typeface="Consolas" charset="0"/>
+                <a:cs typeface="Consolas" charset="0"/>
+              </a:rPr>
+              <a:t>wikipedia</a:t>
             </a:r>
             <a:r>
               <a:rPr lang="en-US" sz="2000" dirty="0">
@@ -8982,45 +9118,15 @@
                 <a:ea typeface="Consolas" charset="0"/>
                 <a:cs typeface="Consolas" charset="0"/>
               </a:rPr>
-              <a:t>"call the </a:t>
-            </a:r>
-            <a:r>
-              <a:rPr lang="en-US" sz="2000" dirty="0" err="1">
-                <a:solidFill>
-                  <a:srgbClr val="0225C8"/>
-                </a:solidFill>
-                <a:latin typeface="Consolas" charset="0"/>
-                <a:ea typeface="Consolas" charset="0"/>
-                <a:cs typeface="Consolas" charset="0"/>
-              </a:rPr>
-              <a:t>wikipedia</a:t>
+              <a:t> API, interpret the response and return the result"</a:t>
             </a:r>
             <a:r>
               <a:rPr lang="en-US" sz="2000" dirty="0">
-                <a:solidFill>
-                  <a:srgbClr val="0225C8"/>
-                </a:solidFill>
-                <a:latin typeface="Consolas" charset="0"/>
-                <a:ea typeface="Consolas" charset="0"/>
-                <a:cs typeface="Consolas" charset="0"/>
-              </a:rPr>
-              <a:t> API, interpret the response and return the result"</a:t>
-            </a:r>
-            <a:r>
-              <a:rPr lang="en-US" sz="2000" dirty="0">
-                <a:latin typeface="Consolas" charset="0"/>
-                <a:ea typeface="Consolas" charset="0"/>
-                <a:cs typeface="Consolas" charset="0"/>
-              </a:rPr>
-              <a:t> </a:t>
-            </a:r>
-            <a:r>
-              <a:rPr lang="en-US" sz="2000" dirty="0">
-                <a:latin typeface="Consolas" charset="0"/>
-                <a:ea typeface="Consolas" charset="0"/>
-                <a:cs typeface="Consolas" charset="0"/>
-              </a:rPr>
-              <a:t>in {</a:t>
+                <a:latin typeface="Consolas" charset="0"/>
+                <a:ea typeface="Consolas" charset="0"/>
+                <a:cs typeface="Consolas" charset="0"/>
+              </a:rPr>
+              <a:t> in {</a:t>
             </a:r>
             <a:br>
               <a:rPr lang="en-US" sz="2000" dirty="0">
@@ -9081,15 +9187,7 @@
                 <a:ea typeface="Consolas" charset="0"/>
                 <a:cs typeface="Consolas" charset="0"/>
               </a:rPr>
-              <a:t> </a:t>
-            </a:r>
-            <a:r>
-              <a:rPr lang="en-US" sz="2000" dirty="0">
-                <a:latin typeface="Consolas" charset="0"/>
-                <a:ea typeface="Consolas" charset="0"/>
-                <a:cs typeface="Consolas" charset="0"/>
-              </a:rPr>
-              <a:t>returning </a:t>
+              <a:t> returning </a:t>
             </a:r>
             <a:r>
               <a:rPr lang="en-US" sz="2000" dirty="0" err="1">
@@ -9337,15 +9435,7 @@
                 <a:ea typeface="Consolas" charset="0"/>
                 <a:cs typeface="Consolas" charset="0"/>
               </a:rPr>
-              <a:t> </a:t>
-            </a:r>
-            <a:r>
-              <a:rPr lang="en-US" sz="2000" dirty="0">
-                <a:latin typeface="Consolas" charset="0"/>
-                <a:ea typeface="Consolas" charset="0"/>
-                <a:cs typeface="Consolas" charset="0"/>
-              </a:rPr>
-              <a:t>= </a:t>
+              <a:t> = </a:t>
             </a:r>
             <a:r>
               <a:rPr lang="en-US" sz="2000" i="1" dirty="0" err="1">

</xml_diff>

<commit_message>
add bit.ly link to presentation
</commit_message>
<xml_diff>
--- a/src/main/scala/workshop5/Presentation.pptx
+++ b/src/main/scala/workshop5/Presentation.pptx
@@ -220,7 +220,7 @@
           <a:p>
             <a:fld id="{46FF6343-701E-174E-AA11-326D58F329D9}" type="datetimeFigureOut">
               <a:rPr lang="en-US" smtClean="0"/>
-              <a:t>4/12/17</a:t>
+              <a:t>5/2/17</a:t>
             </a:fld>
             <a:endParaRPr lang="en-US"/>
           </a:p>
@@ -619,7 +619,7 @@
           <a:p>
             <a:fld id="{CAB3AEDB-0CE4-724F-8906-26B9AA19027E}" type="datetimeFigureOut">
               <a:rPr lang="en-US" smtClean="0"/>
-              <a:t>4/12/17</a:t>
+              <a:t>5/2/17</a:t>
             </a:fld>
             <a:endParaRPr lang="en-US"/>
           </a:p>
@@ -789,7 +789,7 @@
           <a:p>
             <a:fld id="{CAB3AEDB-0CE4-724F-8906-26B9AA19027E}" type="datetimeFigureOut">
               <a:rPr lang="en-US" smtClean="0"/>
-              <a:t>4/12/17</a:t>
+              <a:t>5/2/17</a:t>
             </a:fld>
             <a:endParaRPr lang="en-US"/>
           </a:p>
@@ -969,7 +969,7 @@
           <a:p>
             <a:fld id="{CAB3AEDB-0CE4-724F-8906-26B9AA19027E}" type="datetimeFigureOut">
               <a:rPr lang="en-US" smtClean="0"/>
-              <a:t>4/12/17</a:t>
+              <a:t>5/2/17</a:t>
             </a:fld>
             <a:endParaRPr lang="en-US"/>
           </a:p>
@@ -1139,7 +1139,7 @@
           <a:p>
             <a:fld id="{CAB3AEDB-0CE4-724F-8906-26B9AA19027E}" type="datetimeFigureOut">
               <a:rPr lang="en-US" smtClean="0"/>
-              <a:t>4/12/17</a:t>
+              <a:t>5/2/17</a:t>
             </a:fld>
             <a:endParaRPr lang="en-US"/>
           </a:p>
@@ -1385,7 +1385,7 @@
           <a:p>
             <a:fld id="{CAB3AEDB-0CE4-724F-8906-26B9AA19027E}" type="datetimeFigureOut">
               <a:rPr lang="en-US" smtClean="0"/>
-              <a:t>4/12/17</a:t>
+              <a:t>5/2/17</a:t>
             </a:fld>
             <a:endParaRPr lang="en-US"/>
           </a:p>
@@ -1617,7 +1617,7 @@
           <a:p>
             <a:fld id="{CAB3AEDB-0CE4-724F-8906-26B9AA19027E}" type="datetimeFigureOut">
               <a:rPr lang="en-US" smtClean="0"/>
-              <a:t>4/12/17</a:t>
+              <a:t>5/2/17</a:t>
             </a:fld>
             <a:endParaRPr lang="en-US"/>
           </a:p>
@@ -1984,7 +1984,7 @@
           <a:p>
             <a:fld id="{CAB3AEDB-0CE4-724F-8906-26B9AA19027E}" type="datetimeFigureOut">
               <a:rPr lang="en-US" smtClean="0"/>
-              <a:t>4/12/17</a:t>
+              <a:t>5/2/17</a:t>
             </a:fld>
             <a:endParaRPr lang="en-US"/>
           </a:p>
@@ -2102,7 +2102,7 @@
           <a:p>
             <a:fld id="{CAB3AEDB-0CE4-724F-8906-26B9AA19027E}" type="datetimeFigureOut">
               <a:rPr lang="en-US" smtClean="0"/>
-              <a:t>4/12/17</a:t>
+              <a:t>5/2/17</a:t>
             </a:fld>
             <a:endParaRPr lang="en-US"/>
           </a:p>
@@ -2197,7 +2197,7 @@
           <a:p>
             <a:fld id="{CAB3AEDB-0CE4-724F-8906-26B9AA19027E}" type="datetimeFigureOut">
               <a:rPr lang="en-US" smtClean="0"/>
-              <a:t>4/12/17</a:t>
+              <a:t>5/2/17</a:t>
             </a:fld>
             <a:endParaRPr lang="en-US"/>
           </a:p>
@@ -2474,7 +2474,7 @@
           <a:p>
             <a:fld id="{CAB3AEDB-0CE4-724F-8906-26B9AA19027E}" type="datetimeFigureOut">
               <a:rPr lang="en-US" smtClean="0"/>
-              <a:t>4/12/17</a:t>
+              <a:t>5/2/17</a:t>
             </a:fld>
             <a:endParaRPr lang="en-US"/>
           </a:p>
@@ -2727,7 +2727,7 @@
           <a:p>
             <a:fld id="{CAB3AEDB-0CE4-724F-8906-26B9AA19027E}" type="datetimeFigureOut">
               <a:rPr lang="en-US" smtClean="0"/>
-              <a:t>4/12/17</a:t>
+              <a:t>5/2/17</a:t>
             </a:fld>
             <a:endParaRPr lang="en-US"/>
           </a:p>
@@ -2940,7 +2940,7 @@
           <a:p>
             <a:fld id="{CAB3AEDB-0CE4-724F-8906-26B9AA19027E}" type="datetimeFigureOut">
               <a:rPr lang="en-US" smtClean="0"/>
-              <a:t>4/12/17</a:t>
+              <a:t>5/2/17</a:t>
             </a:fld>
             <a:endParaRPr lang="en-US"/>
           </a:p>
@@ -3410,7 +3410,12 @@
             <p:ph type="subTitle" idx="1"/>
           </p:nvPr>
         </p:nvSpPr>
-        <p:spPr/>
+        <p:spPr>
+          <a:xfrm>
+            <a:off x="1524000" y="3602037"/>
+            <a:ext cx="9144000" cy="2613411"/>
+          </a:xfrm>
+        </p:spPr>
         <p:txBody>
           <a:bodyPr>
             <a:normAutofit/>
@@ -3429,8 +3434,26 @@
             <a:pPr algn="l"/>
             <a:fld id="{1E98CFF9-AC77-9F41-A6F7-C65A85AD078C}" type="datetime4">
               <a:rPr lang="en-US" sz="2000" smtClean="0"/>
-              <a:t>April 12, 2017</a:t>
+              <a:t>May 2, 2017</a:t>
             </a:fld>
+            <a:endParaRPr lang="en-US" sz="2000" dirty="0" smtClean="0"/>
+          </a:p>
+          <a:p>
+            <a:pPr algn="l"/>
+            <a:endParaRPr lang="en-US" sz="2000" dirty="0"/>
+          </a:p>
+          <a:p>
+            <a:pPr algn="l"/>
+            <a:r>
+              <a:rPr lang="en-US" sz="2000" dirty="0"/>
+              <a:t>Slides &amp; assignments: </a:t>
+            </a:r>
+            <a:r>
+              <a:rPr lang="en-US" sz="2000" dirty="0" smtClean="0">
+                <a:hlinkClick r:id="rId2"/>
+              </a:rPr>
+              <a:t>bit.ly/dans-cake-pattern-workshop</a:t>
+            </a:r>
             <a:endParaRPr lang="en-US" sz="2000" dirty="0" smtClean="0"/>
           </a:p>
         </p:txBody>
@@ -3445,6 +3468,13 @@
   <p:clrMapOvr>
     <a:masterClrMapping/>
   </p:clrMapOvr>
+  <p:timing>
+    <p:tnLst>
+      <p:par>
+        <p:cTn id="1" dur="indefinite" restart="never" nodeType="tmRoot"/>
+      </p:par>
+    </p:tnLst>
+  </p:timing>
 </p:sld>
 </file>
 
@@ -6657,24 +6687,23 @@
             </a:r>
             <a:r>
               <a:rPr lang="en-US" dirty="0"/>
-              <a:t>GitHub repository (</a:t>
-            </a:r>
-            <a:r>
-              <a:rPr lang="en-US" dirty="0">
-                <a:hlinkClick r:id="rId2"/>
-              </a:rPr>
-              <a:t>https://</a:t>
+              <a:t>GitHub repository </a:t>
+            </a:r>
+            <a:r>
+              <a:rPr lang="en-US" dirty="0" smtClean="0"/>
+              <a:t>(</a:t>
             </a:r>
             <a:r>
               <a:rPr lang="en-US" dirty="0" smtClean="0">
                 <a:hlinkClick r:id="rId2"/>
               </a:rPr>
-              <a:t>github.com/DANS-KNAW/course-scala</a:t>
+              <a:t>bit.ly/dans-cake-pattern-workshop</a:t>
             </a:r>
             <a:r>
               <a:rPr lang="en-US" dirty="0" smtClean="0"/>
               <a:t>)</a:t>
             </a:r>
+            <a:endParaRPr lang="en-US" dirty="0" smtClean="0"/>
           </a:p>
           <a:p>
             <a:r>
@@ -7662,6 +7691,13 @@
   <p:clrMapOvr>
     <a:masterClrMapping/>
   </p:clrMapOvr>
+  <p:timing>
+    <p:tnLst>
+      <p:par>
+        <p:cTn id="1" dur="indefinite" restart="never" nodeType="tmRoot"/>
+      </p:par>
+    </p:tnLst>
+  </p:timing>
 </p:sld>
 </file>
 

</xml_diff>